<commit_message>
Comments from Adam added
</commit_message>
<xml_diff>
--- a/figures8cm.pptx
+++ b/figures8cm.pptx
@@ -197,7 +197,8 @@
           <a:p>
             <a:fld id="{AC39F9EC-1C84-462C-976F-AFC0CE4CADE8}" type="datetimeFigureOut">
               <a:rPr lang="en-GB" smtClean="0"/>
-              <a:t>29/05/2015</a:t>
+              <a:pPr/>
+              <a:t>16/07/2015</a:t>
             </a:fld>
             <a:endParaRPr lang="en-GB"/>
           </a:p>
@@ -358,6 +359,7 @@
           <a:p>
             <a:fld id="{3F84806E-C42F-45A9-B0A4-C38C49AF38A5}" type="slidenum">
               <a:rPr lang="en-GB" smtClean="0"/>
+              <a:pPr/>
               <a:t>‹#›</a:t>
             </a:fld>
             <a:endParaRPr lang="en-GB"/>
@@ -538,6 +540,7 @@
           <a:p>
             <a:fld id="{3F84806E-C42F-45A9-B0A4-C38C49AF38A5}" type="slidenum">
               <a:rPr lang="en-GB" smtClean="0"/>
+              <a:pPr/>
               <a:t>1</a:t>
             </a:fld>
             <a:endParaRPr lang="en-GB"/>
@@ -628,6 +631,7 @@
           <a:p>
             <a:fld id="{3F84806E-C42F-45A9-B0A4-C38C49AF38A5}" type="slidenum">
               <a:rPr lang="en-GB" smtClean="0"/>
+              <a:pPr/>
               <a:t>2</a:t>
             </a:fld>
             <a:endParaRPr lang="en-GB"/>
@@ -718,6 +722,7 @@
           <a:p>
             <a:fld id="{3F84806E-C42F-45A9-B0A4-C38C49AF38A5}" type="slidenum">
               <a:rPr lang="en-GB" smtClean="0"/>
+              <a:pPr/>
               <a:t>3</a:t>
             </a:fld>
             <a:endParaRPr lang="en-GB"/>
@@ -808,6 +813,7 @@
           <a:p>
             <a:fld id="{3F84806E-C42F-45A9-B0A4-C38C49AF38A5}" type="slidenum">
               <a:rPr lang="en-GB" smtClean="0"/>
+              <a:pPr/>
               <a:t>4</a:t>
             </a:fld>
             <a:endParaRPr lang="en-GB"/>
@@ -1004,7 +1010,7 @@
             <a:fld id="{3260E9CB-E03B-4981-984A-9DFEF440CF5E}" type="datetimeFigureOut">
               <a:rPr lang="en-GB" smtClean="0"/>
               <a:pPr/>
-              <a:t>29/05/2015</a:t>
+              <a:t>16/07/2015</a:t>
             </a:fld>
             <a:endParaRPr lang="en-GB"/>
           </a:p>
@@ -1171,7 +1177,7 @@
             <a:fld id="{3260E9CB-E03B-4981-984A-9DFEF440CF5E}" type="datetimeFigureOut">
               <a:rPr lang="en-GB" smtClean="0"/>
               <a:pPr/>
-              <a:t>29/05/2015</a:t>
+              <a:t>16/07/2015</a:t>
             </a:fld>
             <a:endParaRPr lang="en-GB"/>
           </a:p>
@@ -1348,7 +1354,7 @@
             <a:fld id="{3260E9CB-E03B-4981-984A-9DFEF440CF5E}" type="datetimeFigureOut">
               <a:rPr lang="en-GB" smtClean="0"/>
               <a:pPr/>
-              <a:t>29/05/2015</a:t>
+              <a:t>16/07/2015</a:t>
             </a:fld>
             <a:endParaRPr lang="en-GB"/>
           </a:p>
@@ -1515,7 +1521,7 @@
             <a:fld id="{3260E9CB-E03B-4981-984A-9DFEF440CF5E}" type="datetimeFigureOut">
               <a:rPr lang="en-GB" smtClean="0"/>
               <a:pPr/>
-              <a:t>29/05/2015</a:t>
+              <a:t>16/07/2015</a:t>
             </a:fld>
             <a:endParaRPr lang="en-GB"/>
           </a:p>
@@ -1758,7 +1764,7 @@
             <a:fld id="{3260E9CB-E03B-4981-984A-9DFEF440CF5E}" type="datetimeFigureOut">
               <a:rPr lang="en-GB" smtClean="0"/>
               <a:pPr/>
-              <a:t>29/05/2015</a:t>
+              <a:t>16/07/2015</a:t>
             </a:fld>
             <a:endParaRPr lang="en-GB"/>
           </a:p>
@@ -2043,7 +2049,7 @@
             <a:fld id="{3260E9CB-E03B-4981-984A-9DFEF440CF5E}" type="datetimeFigureOut">
               <a:rPr lang="en-GB" smtClean="0"/>
               <a:pPr/>
-              <a:t>29/05/2015</a:t>
+              <a:t>16/07/2015</a:t>
             </a:fld>
             <a:endParaRPr lang="en-GB"/>
           </a:p>
@@ -2467,7 +2473,7 @@
             <a:fld id="{3260E9CB-E03B-4981-984A-9DFEF440CF5E}" type="datetimeFigureOut">
               <a:rPr lang="en-GB" smtClean="0"/>
               <a:pPr/>
-              <a:t>29/05/2015</a:t>
+              <a:t>16/07/2015</a:t>
             </a:fld>
             <a:endParaRPr lang="en-GB"/>
           </a:p>
@@ -2582,7 +2588,7 @@
             <a:fld id="{3260E9CB-E03B-4981-984A-9DFEF440CF5E}" type="datetimeFigureOut">
               <a:rPr lang="en-GB" smtClean="0"/>
               <a:pPr/>
-              <a:t>29/05/2015</a:t>
+              <a:t>16/07/2015</a:t>
             </a:fld>
             <a:endParaRPr lang="en-GB"/>
           </a:p>
@@ -2674,7 +2680,7 @@
             <a:fld id="{3260E9CB-E03B-4981-984A-9DFEF440CF5E}" type="datetimeFigureOut">
               <a:rPr lang="en-GB" smtClean="0"/>
               <a:pPr/>
-              <a:t>29/05/2015</a:t>
+              <a:t>16/07/2015</a:t>
             </a:fld>
             <a:endParaRPr lang="en-GB"/>
           </a:p>
@@ -2948,7 +2954,7 @@
             <a:fld id="{3260E9CB-E03B-4981-984A-9DFEF440CF5E}" type="datetimeFigureOut">
               <a:rPr lang="en-GB" smtClean="0"/>
               <a:pPr/>
-              <a:t>29/05/2015</a:t>
+              <a:t>16/07/2015</a:t>
             </a:fld>
             <a:endParaRPr lang="en-GB"/>
           </a:p>
@@ -3198,7 +3204,7 @@
             <a:fld id="{3260E9CB-E03B-4981-984A-9DFEF440CF5E}" type="datetimeFigureOut">
               <a:rPr lang="en-GB" smtClean="0"/>
               <a:pPr/>
-              <a:t>29/05/2015</a:t>
+              <a:t>16/07/2015</a:t>
             </a:fld>
             <a:endParaRPr lang="en-GB"/>
           </a:p>
@@ -3408,7 +3414,7 @@
             <a:fld id="{3260E9CB-E03B-4981-984A-9DFEF440CF5E}" type="datetimeFigureOut">
               <a:rPr lang="en-GB" smtClean="0"/>
               <a:pPr/>
-              <a:t>29/05/2015</a:t>
+              <a:t>16/07/2015</a:t>
             </a:fld>
             <a:endParaRPr lang="en-GB"/>
           </a:p>
@@ -3779,186 +3785,349 @@
           <a:chExt cx="0" cy="0"/>
         </a:xfrm>
       </p:grpSpPr>
-      <p:sp>
-        <p:nvSpPr>
-          <p:cNvPr id="4" name="Parallelogram 3"/>
-          <p:cNvSpPr/>
-          <p:nvPr/>
-        </p:nvSpPr>
-        <p:spPr>
-          <a:xfrm>
-            <a:off x="503758" y="116632"/>
-            <a:ext cx="1728192" cy="360040"/>
-          </a:xfrm>
-          <a:prstGeom prst="parallelogram">
-            <a:avLst/>
-          </a:prstGeom>
-          <a:solidFill>
-            <a:schemeClr val="accent1">
-              <a:lumMod val="40000"/>
-              <a:lumOff val="60000"/>
-            </a:schemeClr>
-          </a:solidFill>
-        </p:spPr>
-        <p:style>
-          <a:lnRef idx="2">
-            <a:schemeClr val="accent1">
-              <a:shade val="50000"/>
-            </a:schemeClr>
-          </a:lnRef>
-          <a:fillRef idx="1">
-            <a:schemeClr val="accent1"/>
-          </a:fillRef>
-          <a:effectRef idx="0">
-            <a:schemeClr val="accent1"/>
-          </a:effectRef>
-          <a:fontRef idx="minor">
-            <a:schemeClr val="lt1"/>
-          </a:fontRef>
-        </p:style>
-        <p:txBody>
-          <a:bodyPr rtlCol="0" anchor="ctr"/>
-          <a:lstStyle/>
-          <a:p>
-            <a:pPr algn="ctr"/>
-            <a:r>
-              <a:rPr lang="en-US" sz="1050" b="1" dirty="0" smtClean="0"/>
-              <a:t>N Frames, concentration</a:t>
-            </a:r>
-            <a:endParaRPr lang="en-GB" sz="1050" b="1" dirty="0"/>
-          </a:p>
-        </p:txBody>
-      </p:sp>
-      <p:sp>
-        <p:nvSpPr>
-          <p:cNvPr id="5" name="Rectangle 4"/>
-          <p:cNvSpPr/>
-          <p:nvPr/>
-        </p:nvSpPr>
-        <p:spPr>
-          <a:xfrm>
-            <a:off x="539762" y="656692"/>
-            <a:ext cx="1656184" cy="360040"/>
-          </a:xfrm>
-          <a:prstGeom prst="rect">
-            <a:avLst/>
-          </a:prstGeom>
-        </p:spPr>
-        <p:style>
-          <a:lnRef idx="2">
-            <a:schemeClr val="accent3">
-              <a:shade val="50000"/>
-            </a:schemeClr>
-          </a:lnRef>
-          <a:fillRef idx="1">
-            <a:schemeClr val="accent3"/>
-          </a:fillRef>
-          <a:effectRef idx="0">
-            <a:schemeClr val="accent3"/>
-          </a:effectRef>
-          <a:fontRef idx="minor">
-            <a:schemeClr val="lt1"/>
-          </a:fontRef>
-        </p:style>
-        <p:txBody>
-          <a:bodyPr rtlCol="0" anchor="ctr"/>
-          <a:lstStyle/>
-          <a:p>
-            <a:pPr algn="ctr"/>
-            <a:r>
-              <a:rPr lang="en-US" sz="1050" b="1" dirty="0" smtClean="0"/>
-              <a:t>Compare to 1</a:t>
-            </a:r>
-            <a:r>
-              <a:rPr lang="en-US" sz="1050" b="1" baseline="30000" dirty="0" smtClean="0"/>
-              <a:t>st</a:t>
-            </a:r>
-            <a:r>
-              <a:rPr lang="en-US" sz="1050" b="1" dirty="0" smtClean="0"/>
-              <a:t> frame using </a:t>
-            </a:r>
-            <a:r>
-              <a:rPr lang="en-US" sz="1050" b="1" dirty="0" err="1" smtClean="0"/>
-              <a:t>datcmp</a:t>
-            </a:r>
-            <a:endParaRPr lang="en-GB" sz="1050" b="1" dirty="0"/>
-          </a:p>
-        </p:txBody>
-      </p:sp>
-      <p:sp>
-        <p:nvSpPr>
-          <p:cNvPr id="6" name="Diamond 5"/>
-          <p:cNvSpPr/>
-          <p:nvPr/>
-        </p:nvSpPr>
-        <p:spPr>
-          <a:xfrm>
-            <a:off x="1043818" y="1196752"/>
-            <a:ext cx="648072" cy="648072"/>
-          </a:xfrm>
-          <a:prstGeom prst="diamond">
-            <a:avLst/>
-          </a:prstGeom>
-          <a:solidFill>
-            <a:schemeClr val="tx1">
-              <a:lumMod val="95000"/>
-              <a:lumOff val="5000"/>
-            </a:schemeClr>
-          </a:solidFill>
-        </p:spPr>
-        <p:style>
-          <a:lnRef idx="2">
-            <a:schemeClr val="accent1">
-              <a:shade val="50000"/>
-            </a:schemeClr>
-          </a:lnRef>
-          <a:fillRef idx="1">
-            <a:schemeClr val="accent1"/>
-          </a:fillRef>
-          <a:effectRef idx="0">
-            <a:schemeClr val="accent1"/>
-          </a:effectRef>
-          <a:fontRef idx="minor">
-            <a:schemeClr val="lt1"/>
-          </a:fontRef>
-        </p:style>
-        <p:txBody>
-          <a:bodyPr rtlCol="0" anchor="ctr"/>
-          <a:lstStyle/>
-          <a:p>
-            <a:pPr algn="ctr"/>
-            <a:r>
-              <a:rPr lang="en-US" sz="1050" b="1" dirty="0" smtClean="0"/>
-              <a:t>p</a:t>
-            </a:r>
-            <a:endParaRPr lang="en-GB" sz="1050" b="1" dirty="0"/>
-          </a:p>
-        </p:txBody>
-      </p:sp>
       <p:grpSp>
         <p:nvGrpSpPr>
-          <p:cNvPr id="25" name="Group 24"/>
+          <p:cNvPr id="78" name="Group 77"/>
           <p:cNvGrpSpPr/>
           <p:nvPr/>
         </p:nvGrpSpPr>
         <p:grpSpPr>
           <a:xfrm>
-            <a:off x="143718" y="2114895"/>
-            <a:ext cx="2448272" cy="288032"/>
-            <a:chOff x="143718" y="1977157"/>
-            <a:chExt cx="2448272" cy="288032"/>
+            <a:off x="-298" y="116632"/>
+            <a:ext cx="2808014" cy="6264696"/>
+            <a:chOff x="0" y="116632"/>
+            <a:chExt cx="2808014" cy="6264696"/>
           </a:xfrm>
         </p:grpSpPr>
         <p:sp>
           <p:nvSpPr>
-            <p:cNvPr id="7" name="Rectangle 6"/>
+            <p:cNvPr id="4" name="Parallelogram 3"/>
             <p:cNvSpPr/>
             <p:nvPr/>
           </p:nvSpPr>
           <p:spPr>
             <a:xfrm>
-              <a:off x="1511870" y="1977157"/>
-              <a:ext cx="1080120" cy="288032"/>
+              <a:off x="503758" y="116632"/>
+              <a:ext cx="1728192" cy="360040"/>
+            </a:xfrm>
+            <a:prstGeom prst="parallelogram">
+              <a:avLst/>
+            </a:prstGeom>
+            <a:solidFill>
+              <a:schemeClr val="accent1">
+                <a:lumMod val="40000"/>
+                <a:lumOff val="60000"/>
+              </a:schemeClr>
+            </a:solidFill>
+          </p:spPr>
+          <p:style>
+            <a:lnRef idx="2">
+              <a:schemeClr val="accent1">
+                <a:shade val="50000"/>
+              </a:schemeClr>
+            </a:lnRef>
+            <a:fillRef idx="1">
+              <a:schemeClr val="accent1"/>
+            </a:fillRef>
+            <a:effectRef idx="0">
+              <a:schemeClr val="accent1"/>
+            </a:effectRef>
+            <a:fontRef idx="minor">
+              <a:schemeClr val="lt1"/>
+            </a:fontRef>
+          </p:style>
+          <p:txBody>
+            <a:bodyPr rtlCol="0" anchor="ctr"/>
+            <a:lstStyle/>
+            <a:p>
+              <a:pPr algn="ctr"/>
+              <a:r>
+                <a:rPr lang="en-US" sz="1050" b="1" dirty="0" smtClean="0"/>
+                <a:t>N Frames, concentration</a:t>
+              </a:r>
+              <a:endParaRPr lang="en-GB" sz="1050" b="1" dirty="0"/>
+            </a:p>
+          </p:txBody>
+        </p:sp>
+        <p:sp>
+          <p:nvSpPr>
+            <p:cNvPr id="5" name="Rectangle 4"/>
+            <p:cNvSpPr/>
+            <p:nvPr/>
+          </p:nvSpPr>
+          <p:spPr>
+            <a:xfrm>
+              <a:off x="539762" y="656692"/>
+              <a:ext cx="1656184" cy="360040"/>
+            </a:xfrm>
+            <a:prstGeom prst="rect">
+              <a:avLst/>
+            </a:prstGeom>
+          </p:spPr>
+          <p:style>
+            <a:lnRef idx="2">
+              <a:schemeClr val="accent3">
+                <a:shade val="50000"/>
+              </a:schemeClr>
+            </a:lnRef>
+            <a:fillRef idx="1">
+              <a:schemeClr val="accent3"/>
+            </a:fillRef>
+            <a:effectRef idx="0">
+              <a:schemeClr val="accent3"/>
+            </a:effectRef>
+            <a:fontRef idx="minor">
+              <a:schemeClr val="lt1"/>
+            </a:fontRef>
+          </p:style>
+          <p:txBody>
+            <a:bodyPr rtlCol="0" anchor="ctr"/>
+            <a:lstStyle/>
+            <a:p>
+              <a:pPr algn="ctr"/>
+              <a:r>
+                <a:rPr lang="en-US" sz="1050" b="1" dirty="0" smtClean="0"/>
+                <a:t>Compare to 1</a:t>
+              </a:r>
+              <a:r>
+                <a:rPr lang="en-US" sz="1050" b="1" baseline="30000" dirty="0" smtClean="0"/>
+                <a:t>st</a:t>
+              </a:r>
+              <a:r>
+                <a:rPr lang="en-US" sz="1050" b="1" dirty="0" smtClean="0"/>
+                <a:t> frame using </a:t>
+              </a:r>
+              <a:r>
+                <a:rPr lang="en-US" sz="1050" b="1" dirty="0" err="1" smtClean="0"/>
+                <a:t>datcmp</a:t>
+              </a:r>
+              <a:endParaRPr lang="en-GB" sz="1050" b="1" dirty="0"/>
+            </a:p>
+          </p:txBody>
+        </p:sp>
+        <p:sp>
+          <p:nvSpPr>
+            <p:cNvPr id="6" name="Diamond 5"/>
+            <p:cNvSpPr/>
+            <p:nvPr/>
+          </p:nvSpPr>
+          <p:spPr>
+            <a:xfrm>
+              <a:off x="1043818" y="1196752"/>
+              <a:ext cx="648072" cy="648072"/>
+            </a:xfrm>
+            <a:prstGeom prst="diamond">
+              <a:avLst/>
+            </a:prstGeom>
+            <a:solidFill>
+              <a:schemeClr val="tx1">
+                <a:lumMod val="95000"/>
+                <a:lumOff val="5000"/>
+              </a:schemeClr>
+            </a:solidFill>
+          </p:spPr>
+          <p:style>
+            <a:lnRef idx="2">
+              <a:schemeClr val="accent1">
+                <a:shade val="50000"/>
+              </a:schemeClr>
+            </a:lnRef>
+            <a:fillRef idx="1">
+              <a:schemeClr val="accent1"/>
+            </a:fillRef>
+            <a:effectRef idx="0">
+              <a:schemeClr val="accent1"/>
+            </a:effectRef>
+            <a:fontRef idx="minor">
+              <a:schemeClr val="lt1"/>
+            </a:fontRef>
+          </p:style>
+          <p:txBody>
+            <a:bodyPr rtlCol="0" anchor="ctr"/>
+            <a:lstStyle/>
+            <a:p>
+              <a:pPr algn="ctr"/>
+              <a:r>
+                <a:rPr lang="en-US" sz="1050" b="1" dirty="0" smtClean="0"/>
+                <a:t>p</a:t>
+              </a:r>
+              <a:endParaRPr lang="en-GB" sz="1050" b="1" dirty="0"/>
+            </a:p>
+          </p:txBody>
+        </p:sp>
+        <p:grpSp>
+          <p:nvGrpSpPr>
+            <p:cNvPr id="25" name="Group 24"/>
+            <p:cNvGrpSpPr/>
+            <p:nvPr/>
+          </p:nvGrpSpPr>
+          <p:grpSpPr>
+            <a:xfrm>
+              <a:off x="143718" y="2114895"/>
+              <a:ext cx="2448272" cy="288032"/>
+              <a:chOff x="143718" y="1977157"/>
+              <a:chExt cx="2448272" cy="288032"/>
+            </a:xfrm>
+          </p:grpSpPr>
+          <p:sp>
+            <p:nvSpPr>
+              <p:cNvPr id="7" name="Rectangle 6"/>
+              <p:cNvSpPr/>
+              <p:nvPr/>
+            </p:nvSpPr>
+            <p:spPr>
+              <a:xfrm>
+                <a:off x="1511870" y="1977157"/>
+                <a:ext cx="1080120" cy="288032"/>
+              </a:xfrm>
+              <a:prstGeom prst="rect">
+                <a:avLst/>
+              </a:prstGeom>
+              <a:solidFill>
+                <a:schemeClr val="accent1">
+                  <a:lumMod val="75000"/>
+                </a:schemeClr>
+              </a:solidFill>
+            </p:spPr>
+            <p:style>
+              <a:lnRef idx="2">
+                <a:schemeClr val="accent1">
+                  <a:shade val="50000"/>
+                </a:schemeClr>
+              </a:lnRef>
+              <a:fillRef idx="1">
+                <a:schemeClr val="accent1"/>
+              </a:fillRef>
+              <a:effectRef idx="0">
+                <a:schemeClr val="accent1"/>
+              </a:effectRef>
+              <a:fontRef idx="minor">
+                <a:schemeClr val="lt1"/>
+              </a:fontRef>
+            </p:style>
+            <p:txBody>
+              <a:bodyPr rtlCol="0" anchor="ctr"/>
+              <a:lstStyle/>
+              <a:p>
+                <a:pPr algn="ctr"/>
+                <a:r>
+                  <a:rPr lang="en-US" sz="1050" b="1" dirty="0" smtClean="0"/>
+                  <a:t>Average</a:t>
+                </a:r>
+                <a:endParaRPr lang="en-GB" sz="1050" b="1" dirty="0"/>
+              </a:p>
+            </p:txBody>
+          </p:sp>
+          <p:sp>
+            <p:nvSpPr>
+              <p:cNvPr id="10" name="Rectangle 9"/>
+              <p:cNvSpPr/>
+              <p:nvPr/>
+            </p:nvSpPr>
+            <p:spPr>
+              <a:xfrm>
+                <a:off x="143718" y="1977157"/>
+                <a:ext cx="1007814" cy="288032"/>
+              </a:xfrm>
+              <a:prstGeom prst="rect">
+                <a:avLst/>
+              </a:prstGeom>
+              <a:solidFill>
+                <a:schemeClr val="accent1">
+                  <a:lumMod val="75000"/>
+                </a:schemeClr>
+              </a:solidFill>
+            </p:spPr>
+            <p:style>
+              <a:lnRef idx="2">
+                <a:schemeClr val="accent1">
+                  <a:shade val="50000"/>
+                </a:schemeClr>
+              </a:lnRef>
+              <a:fillRef idx="1">
+                <a:schemeClr val="accent1"/>
+              </a:fillRef>
+              <a:effectRef idx="0">
+                <a:schemeClr val="accent1"/>
+              </a:effectRef>
+              <a:fontRef idx="minor">
+                <a:schemeClr val="lt1"/>
+              </a:fontRef>
+            </p:style>
+            <p:txBody>
+              <a:bodyPr rtlCol="0" anchor="ctr"/>
+              <a:lstStyle/>
+              <a:p>
+                <a:pPr algn="ctr"/>
+                <a:r>
+                  <a:rPr lang="en-US" sz="1050" b="1" dirty="0" smtClean="0"/>
+                  <a:t>Discard</a:t>
+                </a:r>
+                <a:endParaRPr lang="en-GB" sz="1050" b="1" dirty="0"/>
+              </a:p>
+            </p:txBody>
+          </p:sp>
+        </p:grpSp>
+        <p:sp>
+          <p:nvSpPr>
+            <p:cNvPr id="12" name="Parallelogram 11"/>
+            <p:cNvSpPr/>
+            <p:nvPr/>
+          </p:nvSpPr>
+          <p:spPr>
+            <a:xfrm>
+              <a:off x="1296143" y="2612966"/>
+              <a:ext cx="1511871" cy="314973"/>
+            </a:xfrm>
+            <a:prstGeom prst="parallelogram">
+              <a:avLst/>
+            </a:prstGeom>
+            <a:solidFill>
+              <a:schemeClr val="accent4">
+                <a:lumMod val="60000"/>
+                <a:lumOff val="40000"/>
+              </a:schemeClr>
+            </a:solidFill>
+          </p:spPr>
+          <p:style>
+            <a:lnRef idx="2">
+              <a:schemeClr val="accent1">
+                <a:shade val="50000"/>
+              </a:schemeClr>
+            </a:lnRef>
+            <a:fillRef idx="1">
+              <a:schemeClr val="accent1"/>
+            </a:fillRef>
+            <a:effectRef idx="0">
+              <a:schemeClr val="accent1"/>
+            </a:effectRef>
+            <a:fontRef idx="minor">
+              <a:schemeClr val="lt1"/>
+            </a:fontRef>
+          </p:style>
+          <p:txBody>
+            <a:bodyPr rtlCol="0" anchor="ctr"/>
+            <a:lstStyle/>
+            <a:p>
+              <a:pPr algn="ctr"/>
+              <a:r>
+                <a:rPr lang="en-US" sz="1050" b="1" dirty="0" smtClean="0"/>
+                <a:t>Averaged file</a:t>
+              </a:r>
+              <a:endParaRPr lang="en-GB" sz="1050" b="1" dirty="0"/>
+            </a:p>
+          </p:txBody>
+        </p:sp>
+        <p:sp>
+          <p:nvSpPr>
+            <p:cNvPr id="13" name="Rectangle 12"/>
+            <p:cNvSpPr/>
+            <p:nvPr/>
+          </p:nvSpPr>
+          <p:spPr>
+            <a:xfrm>
+              <a:off x="143986" y="4005064"/>
+              <a:ext cx="1368449" cy="360040"/>
             </a:xfrm>
             <a:prstGeom prst="rect">
               <a:avLst/>
@@ -3991,8 +4160,8 @@
             <a:p>
               <a:pPr algn="ctr"/>
               <a:r>
-                <a:rPr lang="en-US" sz="1050" b="1" dirty="0" smtClean="0"/>
-                <a:t>Average</a:t>
+                <a:rPr lang="en-US" sz="1050" b="1" dirty="0" err="1" smtClean="0"/>
+                <a:t>AutoSub</a:t>
               </a:r>
               <a:endParaRPr lang="en-GB" sz="1050" b="1" dirty="0"/>
             </a:p>
@@ -4000,14 +4169,14 @@
         </p:sp>
         <p:sp>
           <p:nvSpPr>
-            <p:cNvPr id="10" name="Rectangle 9"/>
+            <p:cNvPr id="14" name="Rectangle 13"/>
             <p:cNvSpPr/>
             <p:nvPr/>
           </p:nvSpPr>
           <p:spPr>
             <a:xfrm>
-              <a:off x="143718" y="1977157"/>
-              <a:ext cx="1007814" cy="288032"/>
+              <a:off x="143986" y="5013176"/>
+              <a:ext cx="1368449" cy="360040"/>
             </a:xfrm>
             <a:prstGeom prst="rect">
               <a:avLst/>
@@ -4040,273 +4209,8 @@
             <a:p>
               <a:pPr algn="ctr"/>
               <a:r>
-                <a:rPr lang="en-US" sz="1050" b="1" dirty="0" smtClean="0"/>
-                <a:t>Discard</a:t>
-              </a:r>
-              <a:endParaRPr lang="en-GB" sz="1050" b="1" dirty="0"/>
-            </a:p>
-          </p:txBody>
-        </p:sp>
-      </p:grpSp>
-      <p:sp>
-        <p:nvSpPr>
-          <p:cNvPr id="12" name="Parallelogram 11"/>
-          <p:cNvSpPr/>
-          <p:nvPr/>
-        </p:nvSpPr>
-        <p:spPr>
-          <a:xfrm>
-            <a:off x="1296143" y="2612966"/>
-            <a:ext cx="1511871" cy="314973"/>
-          </a:xfrm>
-          <a:prstGeom prst="parallelogram">
-            <a:avLst/>
-          </a:prstGeom>
-          <a:solidFill>
-            <a:schemeClr val="accent4">
-              <a:lumMod val="60000"/>
-              <a:lumOff val="40000"/>
-            </a:schemeClr>
-          </a:solidFill>
-        </p:spPr>
-        <p:style>
-          <a:lnRef idx="2">
-            <a:schemeClr val="accent1">
-              <a:shade val="50000"/>
-            </a:schemeClr>
-          </a:lnRef>
-          <a:fillRef idx="1">
-            <a:schemeClr val="accent1"/>
-          </a:fillRef>
-          <a:effectRef idx="0">
-            <a:schemeClr val="accent1"/>
-          </a:effectRef>
-          <a:fontRef idx="minor">
-            <a:schemeClr val="lt1"/>
-          </a:fontRef>
-        </p:style>
-        <p:txBody>
-          <a:bodyPr rtlCol="0" anchor="ctr"/>
-          <a:lstStyle/>
-          <a:p>
-            <a:pPr algn="ctr"/>
-            <a:r>
-              <a:rPr lang="en-US" sz="1050" b="1" dirty="0" smtClean="0"/>
-              <a:t>Averaged file</a:t>
-            </a:r>
-            <a:endParaRPr lang="en-GB" sz="1050" b="1" dirty="0"/>
-          </a:p>
-        </p:txBody>
-      </p:sp>
-      <p:sp>
-        <p:nvSpPr>
-          <p:cNvPr id="13" name="Rectangle 12"/>
-          <p:cNvSpPr/>
-          <p:nvPr/>
-        </p:nvSpPr>
-        <p:spPr>
-          <a:xfrm>
-            <a:off x="143986" y="4005064"/>
-            <a:ext cx="1368449" cy="360040"/>
-          </a:xfrm>
-          <a:prstGeom prst="rect">
-            <a:avLst/>
-          </a:prstGeom>
-          <a:solidFill>
-            <a:schemeClr val="accent1">
-              <a:lumMod val="75000"/>
-            </a:schemeClr>
-          </a:solidFill>
-        </p:spPr>
-        <p:style>
-          <a:lnRef idx="2">
-            <a:schemeClr val="accent1">
-              <a:shade val="50000"/>
-            </a:schemeClr>
-          </a:lnRef>
-          <a:fillRef idx="1">
-            <a:schemeClr val="accent1"/>
-          </a:fillRef>
-          <a:effectRef idx="0">
-            <a:schemeClr val="accent1"/>
-          </a:effectRef>
-          <a:fontRef idx="minor">
-            <a:schemeClr val="lt1"/>
-          </a:fontRef>
-        </p:style>
-        <p:txBody>
-          <a:bodyPr rtlCol="0" anchor="ctr"/>
-          <a:lstStyle/>
-          <a:p>
-            <a:pPr algn="ctr"/>
-            <a:r>
-              <a:rPr lang="en-US" sz="1050" b="1" dirty="0" err="1" smtClean="0"/>
-              <a:t>AutoSub</a:t>
-            </a:r>
-            <a:endParaRPr lang="en-GB" sz="1050" b="1" dirty="0"/>
-          </a:p>
-        </p:txBody>
-      </p:sp>
-      <p:sp>
-        <p:nvSpPr>
-          <p:cNvPr id="14" name="Rectangle 13"/>
-          <p:cNvSpPr/>
-          <p:nvPr/>
-        </p:nvSpPr>
-        <p:spPr>
-          <a:xfrm>
-            <a:off x="143986" y="5013176"/>
-            <a:ext cx="1368449" cy="360040"/>
-          </a:xfrm>
-          <a:prstGeom prst="rect">
-            <a:avLst/>
-          </a:prstGeom>
-          <a:solidFill>
-            <a:schemeClr val="accent1">
-              <a:lumMod val="75000"/>
-            </a:schemeClr>
-          </a:solidFill>
-        </p:spPr>
-        <p:style>
-          <a:lnRef idx="2">
-            <a:schemeClr val="accent1">
-              <a:shade val="50000"/>
-            </a:schemeClr>
-          </a:lnRef>
-          <a:fillRef idx="1">
-            <a:schemeClr val="accent1"/>
-          </a:fillRef>
-          <a:effectRef idx="0">
-            <a:schemeClr val="accent1"/>
-          </a:effectRef>
-          <a:fontRef idx="minor">
-            <a:schemeClr val="lt1"/>
-          </a:fontRef>
-        </p:style>
-        <p:txBody>
-          <a:bodyPr rtlCol="0" anchor="ctr"/>
-          <a:lstStyle/>
-          <a:p>
-            <a:pPr algn="ctr"/>
-            <a:r>
-              <a:rPr lang="en-US" sz="1050" b="1" dirty="0" err="1" smtClean="0"/>
-              <a:t>SAXSAnalysis</a:t>
-            </a:r>
-            <a:endParaRPr lang="en-GB" sz="1050" b="1" dirty="0"/>
-          </a:p>
-        </p:txBody>
-      </p:sp>
-      <p:sp>
-        <p:nvSpPr>
-          <p:cNvPr id="15" name="Parallelogram 14"/>
-          <p:cNvSpPr/>
-          <p:nvPr/>
-        </p:nvSpPr>
-        <p:spPr>
-          <a:xfrm>
-            <a:off x="72275" y="4531656"/>
-            <a:ext cx="1511871" cy="314973"/>
-          </a:xfrm>
-          <a:prstGeom prst="parallelogram">
-            <a:avLst/>
-          </a:prstGeom>
-          <a:solidFill>
-            <a:schemeClr val="accent4">
-              <a:lumMod val="60000"/>
-              <a:lumOff val="40000"/>
-            </a:schemeClr>
-          </a:solidFill>
-        </p:spPr>
-        <p:style>
-          <a:lnRef idx="2">
-            <a:schemeClr val="accent1">
-              <a:shade val="50000"/>
-            </a:schemeClr>
-          </a:lnRef>
-          <a:fillRef idx="1">
-            <a:schemeClr val="accent1"/>
-          </a:fillRef>
-          <a:effectRef idx="0">
-            <a:schemeClr val="accent1"/>
-          </a:effectRef>
-          <a:fontRef idx="minor">
-            <a:schemeClr val="lt1"/>
-          </a:fontRef>
-        </p:style>
-        <p:txBody>
-          <a:bodyPr rtlCol="0" anchor="ctr"/>
-          <a:lstStyle/>
-          <a:p>
-            <a:pPr algn="ctr"/>
-            <a:r>
-              <a:rPr lang="en-US" sz="1050" b="1" dirty="0" smtClean="0"/>
-              <a:t>Subtracted file</a:t>
-            </a:r>
-            <a:endParaRPr lang="en-GB" sz="1050" b="1" dirty="0"/>
-          </a:p>
-        </p:txBody>
-      </p:sp>
-      <p:grpSp>
-        <p:nvGrpSpPr>
-          <p:cNvPr id="24" name="Group 23"/>
-          <p:cNvGrpSpPr/>
-          <p:nvPr/>
-        </p:nvGrpSpPr>
-        <p:grpSpPr>
-          <a:xfrm>
-            <a:off x="287734" y="5661248"/>
-            <a:ext cx="2232248" cy="720080"/>
-            <a:chOff x="503758" y="5229200"/>
-            <a:chExt cx="1944216" cy="1224136"/>
-          </a:xfrm>
-        </p:grpSpPr>
-        <p:sp>
-          <p:nvSpPr>
-            <p:cNvPr id="19" name="Can 18"/>
-            <p:cNvSpPr/>
-            <p:nvPr/>
-          </p:nvSpPr>
-          <p:spPr>
-            <a:xfrm>
-              <a:off x="503758" y="5229200"/>
-              <a:ext cx="1944216" cy="1224136"/>
-            </a:xfrm>
-            <a:prstGeom prst="can">
-              <a:avLst/>
-            </a:prstGeom>
-          </p:spPr>
-          <p:style>
-            <a:lnRef idx="2">
-              <a:schemeClr val="accent1">
-                <a:shade val="50000"/>
-              </a:schemeClr>
-            </a:lnRef>
-            <a:fillRef idx="1">
-              <a:schemeClr val="accent1"/>
-            </a:fillRef>
-            <a:effectRef idx="0">
-              <a:schemeClr val="accent1"/>
-            </a:effectRef>
-            <a:fontRef idx="minor">
-              <a:schemeClr val="lt1"/>
-            </a:fontRef>
-          </p:style>
-          <p:txBody>
-            <a:bodyPr rtlCol="0" anchor="ctr"/>
-            <a:lstStyle/>
-            <a:p>
-              <a:pPr algn="ctr"/>
-              <a:endParaRPr lang="en-US" sz="1050" b="1" dirty="0"/>
-            </a:p>
-            <a:p>
-              <a:pPr algn="ctr"/>
-              <a:endParaRPr lang="en-US" sz="1050" b="1" dirty="0" smtClean="0"/>
-            </a:p>
-            <a:p>
-              <a:pPr algn="ctr"/>
-              <a:r>
-                <a:rPr lang="en-US" sz="1050" b="1" dirty="0" smtClean="0"/>
-                <a:t>ISPYB</a:t>
+                <a:rPr lang="en-US" sz="1050" b="1" dirty="0" err="1" smtClean="0"/>
+                <a:t>SAXSAnalysis</a:t>
               </a:r>
               <a:endParaRPr lang="en-GB" sz="1050" b="1" dirty="0"/>
             </a:p>
@@ -4314,645 +4218,22 @@
         </p:sp>
         <p:sp>
           <p:nvSpPr>
-            <p:cNvPr id="21" name="Arc 20"/>
-            <p:cNvSpPr/>
-            <p:nvPr/>
-          </p:nvSpPr>
-          <p:spPr>
-            <a:xfrm flipV="1">
-              <a:off x="503758" y="5373216"/>
-              <a:ext cx="1944000" cy="360040"/>
-            </a:xfrm>
-            <a:prstGeom prst="arc">
-              <a:avLst>
-                <a:gd name="adj1" fmla="val 10805774"/>
-                <a:gd name="adj2" fmla="val 0"/>
-              </a:avLst>
-            </a:prstGeom>
-            <a:ln w="38100">
-              <a:solidFill>
-                <a:schemeClr val="accent1">
-                  <a:lumMod val="75000"/>
-                </a:schemeClr>
-              </a:solidFill>
-            </a:ln>
-          </p:spPr>
-          <p:style>
-            <a:lnRef idx="1">
-              <a:schemeClr val="accent1"/>
-            </a:lnRef>
-            <a:fillRef idx="0">
-              <a:schemeClr val="accent1"/>
-            </a:fillRef>
-            <a:effectRef idx="0">
-              <a:schemeClr val="accent1"/>
-            </a:effectRef>
-            <a:fontRef idx="minor">
-              <a:schemeClr val="tx1"/>
-            </a:fontRef>
-          </p:style>
-          <p:txBody>
-            <a:bodyPr rtlCol="0" anchor="ctr"/>
-            <a:lstStyle/>
-            <a:p>
-              <a:pPr algn="ctr"/>
-              <a:endParaRPr lang="en-GB" sz="1050" b="1"/>
-            </a:p>
-          </p:txBody>
-        </p:sp>
-        <p:sp>
-          <p:nvSpPr>
-            <p:cNvPr id="23" name="Arc 22"/>
-            <p:cNvSpPr/>
-            <p:nvPr/>
-          </p:nvSpPr>
-          <p:spPr>
-            <a:xfrm flipV="1">
-              <a:off x="503758" y="5589240"/>
-              <a:ext cx="1944000" cy="360040"/>
-            </a:xfrm>
-            <a:prstGeom prst="arc">
-              <a:avLst>
-                <a:gd name="adj1" fmla="val 10805774"/>
-                <a:gd name="adj2" fmla="val 0"/>
-              </a:avLst>
-            </a:prstGeom>
-            <a:ln w="38100">
-              <a:solidFill>
-                <a:schemeClr val="accent1">
-                  <a:lumMod val="75000"/>
-                </a:schemeClr>
-              </a:solidFill>
-            </a:ln>
-          </p:spPr>
-          <p:style>
-            <a:lnRef idx="1">
-              <a:schemeClr val="accent1"/>
-            </a:lnRef>
-            <a:fillRef idx="0">
-              <a:schemeClr val="accent1"/>
-            </a:fillRef>
-            <a:effectRef idx="0">
-              <a:schemeClr val="accent1"/>
-            </a:effectRef>
-            <a:fontRef idx="minor">
-              <a:schemeClr val="tx1"/>
-            </a:fontRef>
-          </p:style>
-          <p:txBody>
-            <a:bodyPr rtlCol="0" anchor="ctr"/>
-            <a:lstStyle/>
-            <a:p>
-              <a:pPr algn="ctr"/>
-              <a:endParaRPr lang="en-GB" sz="1050" b="1"/>
-            </a:p>
-          </p:txBody>
-        </p:sp>
-      </p:grpSp>
-      <p:cxnSp>
-        <p:nvCxnSpPr>
-          <p:cNvPr id="29" name="Straight Arrow Connector 28"/>
-          <p:cNvCxnSpPr>
-            <a:stCxn id="4" idx="4"/>
-            <a:endCxn id="5" idx="0"/>
-          </p:cNvCxnSpPr>
-          <p:nvPr/>
-        </p:nvCxnSpPr>
-        <p:spPr>
-          <a:xfrm>
-            <a:off x="1367854" y="476672"/>
-            <a:ext cx="0" cy="180020"/>
-          </a:xfrm>
-          <a:prstGeom prst="straightConnector1">
-            <a:avLst/>
-          </a:prstGeom>
-          <a:ln w="28575">
-            <a:tailEnd type="arrow"/>
-          </a:ln>
-        </p:spPr>
-        <p:style>
-          <a:lnRef idx="1">
-            <a:schemeClr val="accent1"/>
-          </a:lnRef>
-          <a:fillRef idx="0">
-            <a:schemeClr val="accent1"/>
-          </a:fillRef>
-          <a:effectRef idx="0">
-            <a:schemeClr val="accent1"/>
-          </a:effectRef>
-          <a:fontRef idx="minor">
-            <a:schemeClr val="tx1"/>
-          </a:fontRef>
-        </p:style>
-      </p:cxnSp>
-      <p:cxnSp>
-        <p:nvCxnSpPr>
-          <p:cNvPr id="32" name="Straight Arrow Connector 31"/>
-          <p:cNvCxnSpPr>
-            <a:stCxn id="5" idx="2"/>
-            <a:endCxn id="6" idx="0"/>
-          </p:cNvCxnSpPr>
-          <p:nvPr/>
-        </p:nvCxnSpPr>
-        <p:spPr>
-          <a:xfrm>
-            <a:off x="1367854" y="1016732"/>
-            <a:ext cx="0" cy="180020"/>
-          </a:xfrm>
-          <a:prstGeom prst="straightConnector1">
-            <a:avLst/>
-          </a:prstGeom>
-          <a:ln w="28575">
-            <a:tailEnd type="arrow"/>
-          </a:ln>
-        </p:spPr>
-        <p:style>
-          <a:lnRef idx="1">
-            <a:schemeClr val="accent1"/>
-          </a:lnRef>
-          <a:fillRef idx="0">
-            <a:schemeClr val="accent1"/>
-          </a:fillRef>
-          <a:effectRef idx="0">
-            <a:schemeClr val="accent1"/>
-          </a:effectRef>
-          <a:fontRef idx="minor">
-            <a:schemeClr val="tx1"/>
-          </a:fontRef>
-        </p:style>
-      </p:cxnSp>
-      <p:cxnSp>
-        <p:nvCxnSpPr>
-          <p:cNvPr id="34" name="Shape 33"/>
-          <p:cNvCxnSpPr>
-            <a:stCxn id="6" idx="1"/>
-            <a:endCxn id="10" idx="0"/>
-          </p:cNvCxnSpPr>
-          <p:nvPr/>
-        </p:nvCxnSpPr>
-        <p:spPr>
-          <a:xfrm rot="10800000" flipV="1">
-            <a:off x="647627" y="1520787"/>
-            <a:ext cx="396193" cy="594107"/>
-          </a:xfrm>
-          <a:prstGeom prst="bentConnector2">
-            <a:avLst/>
-          </a:prstGeom>
-          <a:ln w="28575">
-            <a:tailEnd type="arrow"/>
-          </a:ln>
-        </p:spPr>
-        <p:style>
-          <a:lnRef idx="1">
-            <a:schemeClr val="accent1"/>
-          </a:lnRef>
-          <a:fillRef idx="0">
-            <a:schemeClr val="accent1"/>
-          </a:fillRef>
-          <a:effectRef idx="0">
-            <a:schemeClr val="accent1"/>
-          </a:effectRef>
-          <a:fontRef idx="minor">
-            <a:schemeClr val="tx1"/>
-          </a:fontRef>
-        </p:style>
-      </p:cxnSp>
-      <p:cxnSp>
-        <p:nvCxnSpPr>
-          <p:cNvPr id="36" name="Shape 35"/>
-          <p:cNvCxnSpPr>
-            <a:stCxn id="6" idx="3"/>
-            <a:endCxn id="7" idx="0"/>
-          </p:cNvCxnSpPr>
-          <p:nvPr/>
-        </p:nvCxnSpPr>
-        <p:spPr>
-          <a:xfrm>
-            <a:off x="1691890" y="1520790"/>
-            <a:ext cx="360040" cy="594107"/>
-          </a:xfrm>
-          <a:prstGeom prst="bentConnector2">
-            <a:avLst/>
-          </a:prstGeom>
-          <a:ln w="28575">
-            <a:tailEnd type="arrow"/>
-          </a:ln>
-        </p:spPr>
-        <p:style>
-          <a:lnRef idx="1">
-            <a:schemeClr val="accent1"/>
-          </a:lnRef>
-          <a:fillRef idx="0">
-            <a:schemeClr val="accent1"/>
-          </a:fillRef>
-          <a:effectRef idx="0">
-            <a:schemeClr val="accent1"/>
-          </a:effectRef>
-          <a:fontRef idx="minor">
-            <a:schemeClr val="tx1"/>
-          </a:fontRef>
-        </p:style>
-      </p:cxnSp>
-      <p:cxnSp>
-        <p:nvCxnSpPr>
-          <p:cNvPr id="38" name="Straight Arrow Connector 37"/>
-          <p:cNvCxnSpPr>
-            <a:stCxn id="7" idx="2"/>
-            <a:endCxn id="12" idx="0"/>
-          </p:cNvCxnSpPr>
-          <p:nvPr/>
-        </p:nvCxnSpPr>
-        <p:spPr>
-          <a:xfrm>
-            <a:off x="2051931" y="2402929"/>
-            <a:ext cx="149" cy="210037"/>
-          </a:xfrm>
-          <a:prstGeom prst="straightConnector1">
-            <a:avLst/>
-          </a:prstGeom>
-          <a:ln w="28575">
-            <a:tailEnd type="arrow"/>
-          </a:ln>
-        </p:spPr>
-        <p:style>
-          <a:lnRef idx="1">
-            <a:schemeClr val="accent1"/>
-          </a:lnRef>
-          <a:fillRef idx="0">
-            <a:schemeClr val="accent1"/>
-          </a:fillRef>
-          <a:effectRef idx="0">
-            <a:schemeClr val="accent1"/>
-          </a:effectRef>
-          <a:fontRef idx="minor">
-            <a:schemeClr val="tx1"/>
-          </a:fontRef>
-        </p:style>
-      </p:cxnSp>
-      <p:cxnSp>
-        <p:nvCxnSpPr>
-          <p:cNvPr id="40" name="Straight Arrow Connector 39"/>
-          <p:cNvCxnSpPr>
-            <a:stCxn id="12" idx="3"/>
-            <a:endCxn id="8" idx="0"/>
-          </p:cNvCxnSpPr>
-          <p:nvPr/>
-        </p:nvCxnSpPr>
-        <p:spPr>
-          <a:xfrm>
-            <a:off x="2012707" y="2927939"/>
-            <a:ext cx="3219" cy="429055"/>
-          </a:xfrm>
-          <a:prstGeom prst="straightConnector1">
-            <a:avLst/>
-          </a:prstGeom>
-          <a:ln w="28575">
-            <a:tailEnd type="arrow"/>
-          </a:ln>
-        </p:spPr>
-        <p:style>
-          <a:lnRef idx="1">
-            <a:schemeClr val="accent1"/>
-          </a:lnRef>
-          <a:fillRef idx="0">
-            <a:schemeClr val="accent1"/>
-          </a:fillRef>
-          <a:effectRef idx="0">
-            <a:schemeClr val="accent1"/>
-          </a:effectRef>
-          <a:fontRef idx="minor">
-            <a:schemeClr val="tx1"/>
-          </a:fontRef>
-        </p:style>
-      </p:cxnSp>
-      <p:cxnSp>
-        <p:nvCxnSpPr>
-          <p:cNvPr id="42" name="Straight Arrow Connector 41"/>
-          <p:cNvCxnSpPr>
-            <a:stCxn id="8" idx="2"/>
-          </p:cNvCxnSpPr>
-          <p:nvPr/>
-        </p:nvCxnSpPr>
-        <p:spPr>
-          <a:xfrm>
-            <a:off x="2015926" y="4077072"/>
-            <a:ext cx="0" cy="1584176"/>
-          </a:xfrm>
-          <a:prstGeom prst="straightConnector1">
-            <a:avLst/>
-          </a:prstGeom>
-          <a:ln w="28575">
-            <a:tailEnd type="arrow"/>
-          </a:ln>
-        </p:spPr>
-        <p:style>
-          <a:lnRef idx="1">
-            <a:schemeClr val="accent1"/>
-          </a:lnRef>
-          <a:fillRef idx="0">
-            <a:schemeClr val="accent1"/>
-          </a:fillRef>
-          <a:effectRef idx="0">
-            <a:schemeClr val="accent1"/>
-          </a:effectRef>
-          <a:fontRef idx="minor">
-            <a:schemeClr val="tx1"/>
-          </a:fontRef>
-        </p:style>
-      </p:cxnSp>
-      <p:cxnSp>
-        <p:nvCxnSpPr>
-          <p:cNvPr id="44" name="Shape 43"/>
-          <p:cNvCxnSpPr>
-            <a:stCxn id="8" idx="1"/>
-            <a:endCxn id="13" idx="0"/>
-          </p:cNvCxnSpPr>
-          <p:nvPr/>
-        </p:nvCxnSpPr>
-        <p:spPr>
-          <a:xfrm rot="10800000" flipV="1">
-            <a:off x="828210" y="3717032"/>
-            <a:ext cx="827676" cy="288032"/>
-          </a:xfrm>
-          <a:prstGeom prst="bentConnector2">
-            <a:avLst/>
-          </a:prstGeom>
-          <a:ln w="28575">
-            <a:tailEnd type="arrow"/>
-          </a:ln>
-        </p:spPr>
-        <p:style>
-          <a:lnRef idx="1">
-            <a:schemeClr val="accent1"/>
-          </a:lnRef>
-          <a:fillRef idx="0">
-            <a:schemeClr val="accent1"/>
-          </a:fillRef>
-          <a:effectRef idx="0">
-            <a:schemeClr val="accent1"/>
-          </a:effectRef>
-          <a:fontRef idx="minor">
-            <a:schemeClr val="tx1"/>
-          </a:fontRef>
-        </p:style>
-      </p:cxnSp>
-      <p:cxnSp>
-        <p:nvCxnSpPr>
-          <p:cNvPr id="46" name="Straight Arrow Connector 45"/>
-          <p:cNvCxnSpPr>
-            <a:stCxn id="13" idx="2"/>
-            <a:endCxn id="15" idx="0"/>
-          </p:cNvCxnSpPr>
-          <p:nvPr/>
-        </p:nvCxnSpPr>
-        <p:spPr>
-          <a:xfrm>
-            <a:off x="828210" y="4365104"/>
-            <a:ext cx="0" cy="166550"/>
-          </a:xfrm>
-          <a:prstGeom prst="straightConnector1">
-            <a:avLst/>
-          </a:prstGeom>
-          <a:ln w="28575">
-            <a:tailEnd type="arrow"/>
-          </a:ln>
-        </p:spPr>
-        <p:style>
-          <a:lnRef idx="1">
-            <a:schemeClr val="accent1"/>
-          </a:lnRef>
-          <a:fillRef idx="0">
-            <a:schemeClr val="accent1"/>
-          </a:fillRef>
-          <a:effectRef idx="0">
-            <a:schemeClr val="accent1"/>
-          </a:effectRef>
-          <a:fontRef idx="minor">
-            <a:schemeClr val="tx1"/>
-          </a:fontRef>
-        </p:style>
-      </p:cxnSp>
-      <p:cxnSp>
-        <p:nvCxnSpPr>
-          <p:cNvPr id="51" name="Straight Arrow Connector 50"/>
-          <p:cNvCxnSpPr>
-            <a:stCxn id="15" idx="4"/>
-            <a:endCxn id="14" idx="0"/>
-          </p:cNvCxnSpPr>
-          <p:nvPr/>
-        </p:nvCxnSpPr>
-        <p:spPr>
-          <a:xfrm>
-            <a:off x="828210" y="4846629"/>
-            <a:ext cx="0" cy="166549"/>
-          </a:xfrm>
-          <a:prstGeom prst="straightConnector1">
-            <a:avLst/>
-          </a:prstGeom>
-          <a:ln w="28575">
-            <a:tailEnd type="arrow"/>
-          </a:ln>
-        </p:spPr>
-        <p:style>
-          <a:lnRef idx="1">
-            <a:schemeClr val="accent1"/>
-          </a:lnRef>
-          <a:fillRef idx="0">
-            <a:schemeClr val="accent1"/>
-          </a:fillRef>
-          <a:effectRef idx="0">
-            <a:schemeClr val="accent1"/>
-          </a:effectRef>
-          <a:fontRef idx="minor">
-            <a:schemeClr val="tx1"/>
-          </a:fontRef>
-        </p:style>
-      </p:cxnSp>
-      <p:cxnSp>
-        <p:nvCxnSpPr>
-          <p:cNvPr id="56" name="Straight Arrow Connector 55"/>
-          <p:cNvCxnSpPr/>
-          <p:nvPr/>
-        </p:nvCxnSpPr>
-        <p:spPr>
-          <a:xfrm flipH="1">
-            <a:off x="791790" y="5373216"/>
-            <a:ext cx="110" cy="288032"/>
-          </a:xfrm>
-          <a:prstGeom prst="straightConnector1">
-            <a:avLst/>
-          </a:prstGeom>
-          <a:ln w="28575">
-            <a:tailEnd type="arrow"/>
-          </a:ln>
-        </p:spPr>
-        <p:style>
-          <a:lnRef idx="1">
-            <a:schemeClr val="accent1"/>
-          </a:lnRef>
-          <a:fillRef idx="0">
-            <a:schemeClr val="accent1"/>
-          </a:fillRef>
-          <a:effectRef idx="0">
-            <a:schemeClr val="accent1"/>
-          </a:effectRef>
-          <a:fontRef idx="minor">
-            <a:schemeClr val="tx1"/>
-          </a:fontRef>
-        </p:style>
-      </p:cxnSp>
-      <p:sp>
-        <p:nvSpPr>
-          <p:cNvPr id="58" name="TextBox 57"/>
-          <p:cNvSpPr txBox="1"/>
-          <p:nvPr/>
-        </p:nvSpPr>
-        <p:spPr>
-          <a:xfrm>
-            <a:off x="0" y="1700810"/>
-            <a:ext cx="720080" cy="276999"/>
-          </a:xfrm>
-          <a:prstGeom prst="rect">
-            <a:avLst/>
-          </a:prstGeom>
-          <a:noFill/>
-        </p:spPr>
-        <p:txBody>
-          <a:bodyPr wrap="square" rtlCol="0">
-            <a:spAutoFit/>
-          </a:bodyPr>
-          <a:lstStyle/>
-          <a:p>
-            <a:r>
-              <a:rPr lang="en-US" sz="1200" dirty="0" smtClean="0"/>
-              <a:t>&lt; 0.01</a:t>
-            </a:r>
-            <a:endParaRPr lang="en-GB" sz="1200" dirty="0"/>
-          </a:p>
-        </p:txBody>
-      </p:sp>
-      <p:sp>
-        <p:nvSpPr>
-          <p:cNvPr id="59" name="TextBox 58"/>
-          <p:cNvSpPr txBox="1"/>
-          <p:nvPr/>
-        </p:nvSpPr>
-        <p:spPr>
-          <a:xfrm>
-            <a:off x="2087934" y="1700810"/>
-            <a:ext cx="720080" cy="276999"/>
-          </a:xfrm>
-          <a:prstGeom prst="rect">
-            <a:avLst/>
-          </a:prstGeom>
-          <a:noFill/>
-        </p:spPr>
-        <p:txBody>
-          <a:bodyPr wrap="square" rtlCol="0">
-            <a:spAutoFit/>
-          </a:bodyPr>
-          <a:lstStyle/>
-          <a:p>
-            <a:r>
-              <a:rPr lang="en-GB" sz="1200" dirty="0" smtClean="0"/>
-              <a:t>≥ 0.01 </a:t>
-            </a:r>
-            <a:endParaRPr lang="en-GB" sz="1200" dirty="0"/>
-          </a:p>
-        </p:txBody>
-      </p:sp>
-      <p:sp>
-        <p:nvSpPr>
-          <p:cNvPr id="61" name="TextBox 60"/>
-          <p:cNvSpPr txBox="1"/>
-          <p:nvPr/>
-        </p:nvSpPr>
-        <p:spPr>
-          <a:xfrm>
-            <a:off x="2015926" y="4293098"/>
-            <a:ext cx="720080" cy="276999"/>
-          </a:xfrm>
-          <a:prstGeom prst="rect">
-            <a:avLst/>
-          </a:prstGeom>
-          <a:noFill/>
-        </p:spPr>
-        <p:txBody>
-          <a:bodyPr wrap="square" rtlCol="0">
-            <a:spAutoFit/>
-          </a:bodyPr>
-          <a:lstStyle/>
-          <a:p>
-            <a:r>
-              <a:rPr lang="en-GB" sz="1200" dirty="0" smtClean="0"/>
-              <a:t>no</a:t>
-            </a:r>
-            <a:endParaRPr lang="en-GB" sz="1200" dirty="0"/>
-          </a:p>
-        </p:txBody>
-      </p:sp>
-      <p:sp>
-        <p:nvSpPr>
-          <p:cNvPr id="62" name="TextBox 61"/>
-          <p:cNvSpPr txBox="1"/>
-          <p:nvPr/>
-        </p:nvSpPr>
-        <p:spPr>
-          <a:xfrm>
-            <a:off x="1007814" y="3728067"/>
-            <a:ext cx="720080" cy="276999"/>
-          </a:xfrm>
-          <a:prstGeom prst="rect">
-            <a:avLst/>
-          </a:prstGeom>
-          <a:noFill/>
-        </p:spPr>
-        <p:txBody>
-          <a:bodyPr wrap="square" rtlCol="0">
-            <a:spAutoFit/>
-          </a:bodyPr>
-          <a:lstStyle/>
-          <a:p>
-            <a:r>
-              <a:rPr lang="en-US" sz="1200" dirty="0" smtClean="0"/>
-              <a:t>yes</a:t>
-            </a:r>
-            <a:endParaRPr lang="en-GB" sz="1200" dirty="0"/>
-          </a:p>
-        </p:txBody>
-      </p:sp>
-      <p:grpSp>
-        <p:nvGrpSpPr>
-          <p:cNvPr id="48" name="Group 47"/>
-          <p:cNvGrpSpPr/>
-          <p:nvPr/>
-        </p:nvGrpSpPr>
-        <p:grpSpPr>
-          <a:xfrm>
-            <a:off x="1655886" y="3356992"/>
-            <a:ext cx="792088" cy="720080"/>
-            <a:chOff x="1655886" y="3356992"/>
-            <a:chExt cx="792088" cy="720080"/>
-          </a:xfrm>
-        </p:grpSpPr>
-        <p:sp>
-          <p:nvSpPr>
-            <p:cNvPr id="8" name="Diamond 7"/>
+            <p:cNvPr id="15" name="Parallelogram 14"/>
             <p:cNvSpPr/>
             <p:nvPr/>
           </p:nvSpPr>
           <p:spPr>
             <a:xfrm>
-              <a:off x="1655886" y="3356992"/>
-              <a:ext cx="720080" cy="720080"/>
+              <a:off x="72275" y="4531656"/>
+              <a:ext cx="1511871" cy="314973"/>
             </a:xfrm>
-            <a:prstGeom prst="diamond">
+            <a:prstGeom prst="parallelogram">
               <a:avLst/>
             </a:prstGeom>
             <a:solidFill>
-              <a:schemeClr val="tx1">
-                <a:lumMod val="95000"/>
-                <a:lumOff val="5000"/>
+              <a:schemeClr val="accent4">
+                <a:lumMod val="60000"/>
+                <a:lumOff val="40000"/>
               </a:schemeClr>
             </a:solidFill>
           </p:spPr>
@@ -4977,20 +4258,543 @@
             <a:lstStyle/>
             <a:p>
               <a:pPr algn="ctr"/>
+              <a:r>
+                <a:rPr lang="en-US" sz="1050" b="1" dirty="0" smtClean="0"/>
+                <a:t>Subtracted file</a:t>
+              </a:r>
               <a:endParaRPr lang="en-GB" sz="1050" b="1" dirty="0"/>
             </a:p>
           </p:txBody>
         </p:sp>
+        <p:grpSp>
+          <p:nvGrpSpPr>
+            <p:cNvPr id="24" name="Group 23"/>
+            <p:cNvGrpSpPr/>
+            <p:nvPr/>
+          </p:nvGrpSpPr>
+          <p:grpSpPr>
+            <a:xfrm>
+              <a:off x="287734" y="5661248"/>
+              <a:ext cx="2232248" cy="720080"/>
+              <a:chOff x="503758" y="5229200"/>
+              <a:chExt cx="1944216" cy="1224136"/>
+            </a:xfrm>
+          </p:grpSpPr>
+          <p:sp>
+            <p:nvSpPr>
+              <p:cNvPr id="19" name="Can 18"/>
+              <p:cNvSpPr/>
+              <p:nvPr/>
+            </p:nvSpPr>
+            <p:spPr>
+              <a:xfrm>
+                <a:off x="503758" y="5229200"/>
+                <a:ext cx="1944216" cy="1224136"/>
+              </a:xfrm>
+              <a:prstGeom prst="can">
+                <a:avLst/>
+              </a:prstGeom>
+            </p:spPr>
+            <p:style>
+              <a:lnRef idx="2">
+                <a:schemeClr val="accent1">
+                  <a:shade val="50000"/>
+                </a:schemeClr>
+              </a:lnRef>
+              <a:fillRef idx="1">
+                <a:schemeClr val="accent1"/>
+              </a:fillRef>
+              <a:effectRef idx="0">
+                <a:schemeClr val="accent1"/>
+              </a:effectRef>
+              <a:fontRef idx="minor">
+                <a:schemeClr val="lt1"/>
+              </a:fontRef>
+            </p:style>
+            <p:txBody>
+              <a:bodyPr rtlCol="0" anchor="ctr"/>
+              <a:lstStyle/>
+              <a:p>
+                <a:pPr algn="ctr"/>
+                <a:endParaRPr lang="en-US" sz="1050" b="1" dirty="0"/>
+              </a:p>
+              <a:p>
+                <a:pPr algn="ctr"/>
+                <a:endParaRPr lang="en-US" sz="1050" b="1" dirty="0" smtClean="0"/>
+              </a:p>
+              <a:p>
+                <a:pPr algn="ctr"/>
+                <a:r>
+                  <a:rPr lang="en-US" sz="1050" b="1" dirty="0" smtClean="0"/>
+                  <a:t>ISPYB</a:t>
+                </a:r>
+                <a:endParaRPr lang="en-GB" sz="1050" b="1" dirty="0"/>
+              </a:p>
+            </p:txBody>
+          </p:sp>
+          <p:sp>
+            <p:nvSpPr>
+              <p:cNvPr id="21" name="Arc 20"/>
+              <p:cNvSpPr/>
+              <p:nvPr/>
+            </p:nvSpPr>
+            <p:spPr>
+              <a:xfrm flipV="1">
+                <a:off x="503758" y="5373216"/>
+                <a:ext cx="1944000" cy="360040"/>
+              </a:xfrm>
+              <a:prstGeom prst="arc">
+                <a:avLst>
+                  <a:gd name="adj1" fmla="val 10805774"/>
+                  <a:gd name="adj2" fmla="val 0"/>
+                </a:avLst>
+              </a:prstGeom>
+              <a:ln w="38100">
+                <a:solidFill>
+                  <a:schemeClr val="accent1">
+                    <a:lumMod val="75000"/>
+                  </a:schemeClr>
+                </a:solidFill>
+              </a:ln>
+            </p:spPr>
+            <p:style>
+              <a:lnRef idx="1">
+                <a:schemeClr val="accent1"/>
+              </a:lnRef>
+              <a:fillRef idx="0">
+                <a:schemeClr val="accent1"/>
+              </a:fillRef>
+              <a:effectRef idx="0">
+                <a:schemeClr val="accent1"/>
+              </a:effectRef>
+              <a:fontRef idx="minor">
+                <a:schemeClr val="tx1"/>
+              </a:fontRef>
+            </p:style>
+            <p:txBody>
+              <a:bodyPr rtlCol="0" anchor="ctr"/>
+              <a:lstStyle/>
+              <a:p>
+                <a:pPr algn="ctr"/>
+                <a:endParaRPr lang="en-GB" sz="1050" b="1"/>
+              </a:p>
+            </p:txBody>
+          </p:sp>
+          <p:sp>
+            <p:nvSpPr>
+              <p:cNvPr id="23" name="Arc 22"/>
+              <p:cNvSpPr/>
+              <p:nvPr/>
+            </p:nvSpPr>
+            <p:spPr>
+              <a:xfrm flipV="1">
+                <a:off x="503758" y="5589240"/>
+                <a:ext cx="1944000" cy="360040"/>
+              </a:xfrm>
+              <a:prstGeom prst="arc">
+                <a:avLst>
+                  <a:gd name="adj1" fmla="val 10805774"/>
+                  <a:gd name="adj2" fmla="val 0"/>
+                </a:avLst>
+              </a:prstGeom>
+              <a:ln w="38100">
+                <a:solidFill>
+                  <a:schemeClr val="accent1">
+                    <a:lumMod val="75000"/>
+                  </a:schemeClr>
+                </a:solidFill>
+              </a:ln>
+            </p:spPr>
+            <p:style>
+              <a:lnRef idx="1">
+                <a:schemeClr val="accent1"/>
+              </a:lnRef>
+              <a:fillRef idx="0">
+                <a:schemeClr val="accent1"/>
+              </a:fillRef>
+              <a:effectRef idx="0">
+                <a:schemeClr val="accent1"/>
+              </a:effectRef>
+              <a:fontRef idx="minor">
+                <a:schemeClr val="tx1"/>
+              </a:fontRef>
+            </p:style>
+            <p:txBody>
+              <a:bodyPr rtlCol="0" anchor="ctr"/>
+              <a:lstStyle/>
+              <a:p>
+                <a:pPr algn="ctr"/>
+                <a:endParaRPr lang="en-GB" sz="1050" b="1"/>
+              </a:p>
+            </p:txBody>
+          </p:sp>
+        </p:grpSp>
+        <p:cxnSp>
+          <p:nvCxnSpPr>
+            <p:cNvPr id="29" name="Straight Arrow Connector 28"/>
+            <p:cNvCxnSpPr>
+              <a:stCxn id="4" idx="4"/>
+              <a:endCxn id="5" idx="0"/>
+            </p:cNvCxnSpPr>
+            <p:nvPr/>
+          </p:nvCxnSpPr>
+          <p:spPr>
+            <a:xfrm>
+              <a:off x="1367854" y="476672"/>
+              <a:ext cx="0" cy="180020"/>
+            </a:xfrm>
+            <a:prstGeom prst="straightConnector1">
+              <a:avLst/>
+            </a:prstGeom>
+            <a:ln w="28575">
+              <a:tailEnd type="arrow"/>
+            </a:ln>
+          </p:spPr>
+          <p:style>
+            <a:lnRef idx="1">
+              <a:schemeClr val="accent1"/>
+            </a:lnRef>
+            <a:fillRef idx="0">
+              <a:schemeClr val="accent1"/>
+            </a:fillRef>
+            <a:effectRef idx="0">
+              <a:schemeClr val="accent1"/>
+            </a:effectRef>
+            <a:fontRef idx="minor">
+              <a:schemeClr val="tx1"/>
+            </a:fontRef>
+          </p:style>
+        </p:cxnSp>
+        <p:cxnSp>
+          <p:nvCxnSpPr>
+            <p:cNvPr id="32" name="Straight Arrow Connector 31"/>
+            <p:cNvCxnSpPr>
+              <a:stCxn id="5" idx="2"/>
+              <a:endCxn id="6" idx="0"/>
+            </p:cNvCxnSpPr>
+            <p:nvPr/>
+          </p:nvCxnSpPr>
+          <p:spPr>
+            <a:xfrm>
+              <a:off x="1367854" y="1016732"/>
+              <a:ext cx="0" cy="180020"/>
+            </a:xfrm>
+            <a:prstGeom prst="straightConnector1">
+              <a:avLst/>
+            </a:prstGeom>
+            <a:ln w="28575">
+              <a:tailEnd type="arrow"/>
+            </a:ln>
+          </p:spPr>
+          <p:style>
+            <a:lnRef idx="1">
+              <a:schemeClr val="accent1"/>
+            </a:lnRef>
+            <a:fillRef idx="0">
+              <a:schemeClr val="accent1"/>
+            </a:fillRef>
+            <a:effectRef idx="0">
+              <a:schemeClr val="accent1"/>
+            </a:effectRef>
+            <a:fontRef idx="minor">
+              <a:schemeClr val="tx1"/>
+            </a:fontRef>
+          </p:style>
+        </p:cxnSp>
+        <p:cxnSp>
+          <p:nvCxnSpPr>
+            <p:cNvPr id="34" name="Shape 33"/>
+            <p:cNvCxnSpPr>
+              <a:stCxn id="6" idx="1"/>
+              <a:endCxn id="10" idx="0"/>
+            </p:cNvCxnSpPr>
+            <p:nvPr/>
+          </p:nvCxnSpPr>
+          <p:spPr>
+            <a:xfrm rot="10800000" flipV="1">
+              <a:off x="647627" y="1520787"/>
+              <a:ext cx="396193" cy="594107"/>
+            </a:xfrm>
+            <a:prstGeom prst="bentConnector2">
+              <a:avLst/>
+            </a:prstGeom>
+            <a:ln w="28575">
+              <a:tailEnd type="arrow"/>
+            </a:ln>
+          </p:spPr>
+          <p:style>
+            <a:lnRef idx="1">
+              <a:schemeClr val="accent1"/>
+            </a:lnRef>
+            <a:fillRef idx="0">
+              <a:schemeClr val="accent1"/>
+            </a:fillRef>
+            <a:effectRef idx="0">
+              <a:schemeClr val="accent1"/>
+            </a:effectRef>
+            <a:fontRef idx="minor">
+              <a:schemeClr val="tx1"/>
+            </a:fontRef>
+          </p:style>
+        </p:cxnSp>
+        <p:cxnSp>
+          <p:nvCxnSpPr>
+            <p:cNvPr id="36" name="Shape 35"/>
+            <p:cNvCxnSpPr>
+              <a:stCxn id="6" idx="3"/>
+              <a:endCxn id="7" idx="0"/>
+            </p:cNvCxnSpPr>
+            <p:nvPr/>
+          </p:nvCxnSpPr>
+          <p:spPr>
+            <a:xfrm>
+              <a:off x="1691890" y="1520790"/>
+              <a:ext cx="360040" cy="594107"/>
+            </a:xfrm>
+            <a:prstGeom prst="bentConnector2">
+              <a:avLst/>
+            </a:prstGeom>
+            <a:ln w="28575">
+              <a:tailEnd type="arrow"/>
+            </a:ln>
+          </p:spPr>
+          <p:style>
+            <a:lnRef idx="1">
+              <a:schemeClr val="accent1"/>
+            </a:lnRef>
+            <a:fillRef idx="0">
+              <a:schemeClr val="accent1"/>
+            </a:fillRef>
+            <a:effectRef idx="0">
+              <a:schemeClr val="accent1"/>
+            </a:effectRef>
+            <a:fontRef idx="minor">
+              <a:schemeClr val="tx1"/>
+            </a:fontRef>
+          </p:style>
+        </p:cxnSp>
+        <p:cxnSp>
+          <p:nvCxnSpPr>
+            <p:cNvPr id="38" name="Straight Arrow Connector 37"/>
+            <p:cNvCxnSpPr>
+              <a:stCxn id="7" idx="2"/>
+              <a:endCxn id="12" idx="0"/>
+            </p:cNvCxnSpPr>
+            <p:nvPr/>
+          </p:nvCxnSpPr>
+          <p:spPr>
+            <a:xfrm>
+              <a:off x="2051931" y="2402929"/>
+              <a:ext cx="149" cy="210037"/>
+            </a:xfrm>
+            <a:prstGeom prst="straightConnector1">
+              <a:avLst/>
+            </a:prstGeom>
+            <a:ln w="28575">
+              <a:tailEnd type="arrow"/>
+            </a:ln>
+          </p:spPr>
+          <p:style>
+            <a:lnRef idx="1">
+              <a:schemeClr val="accent1"/>
+            </a:lnRef>
+            <a:fillRef idx="0">
+              <a:schemeClr val="accent1"/>
+            </a:fillRef>
+            <a:effectRef idx="0">
+              <a:schemeClr val="accent1"/>
+            </a:effectRef>
+            <a:fontRef idx="minor">
+              <a:schemeClr val="tx1"/>
+            </a:fontRef>
+          </p:style>
+        </p:cxnSp>
+        <p:cxnSp>
+          <p:nvCxnSpPr>
+            <p:cNvPr id="42" name="Straight Arrow Connector 41"/>
+            <p:cNvCxnSpPr>
+              <a:stCxn id="8" idx="2"/>
+            </p:cNvCxnSpPr>
+            <p:nvPr/>
+          </p:nvCxnSpPr>
+          <p:spPr>
+            <a:xfrm flipH="1">
+              <a:off x="2015926" y="4077072"/>
+              <a:ext cx="36114" cy="1584176"/>
+            </a:xfrm>
+            <a:prstGeom prst="straightConnector1">
+              <a:avLst/>
+            </a:prstGeom>
+            <a:ln w="28575">
+              <a:tailEnd type="arrow"/>
+            </a:ln>
+          </p:spPr>
+          <p:style>
+            <a:lnRef idx="1">
+              <a:schemeClr val="accent1"/>
+            </a:lnRef>
+            <a:fillRef idx="0">
+              <a:schemeClr val="accent1"/>
+            </a:fillRef>
+            <a:effectRef idx="0">
+              <a:schemeClr val="accent1"/>
+            </a:effectRef>
+            <a:fontRef idx="minor">
+              <a:schemeClr val="tx1"/>
+            </a:fontRef>
+          </p:style>
+        </p:cxnSp>
+        <p:cxnSp>
+          <p:nvCxnSpPr>
+            <p:cNvPr id="44" name="Shape 43"/>
+            <p:cNvCxnSpPr>
+              <a:stCxn id="8" idx="1"/>
+              <a:endCxn id="13" idx="0"/>
+            </p:cNvCxnSpPr>
+            <p:nvPr/>
+          </p:nvCxnSpPr>
+          <p:spPr>
+            <a:xfrm rot="10800000" flipV="1">
+              <a:off x="828212" y="3717032"/>
+              <a:ext cx="863789" cy="288032"/>
+            </a:xfrm>
+            <a:prstGeom prst="bentConnector2">
+              <a:avLst/>
+            </a:prstGeom>
+            <a:ln w="28575">
+              <a:tailEnd type="arrow"/>
+            </a:ln>
+          </p:spPr>
+          <p:style>
+            <a:lnRef idx="1">
+              <a:schemeClr val="accent1"/>
+            </a:lnRef>
+            <a:fillRef idx="0">
+              <a:schemeClr val="accent1"/>
+            </a:fillRef>
+            <a:effectRef idx="0">
+              <a:schemeClr val="accent1"/>
+            </a:effectRef>
+            <a:fontRef idx="minor">
+              <a:schemeClr val="tx1"/>
+            </a:fontRef>
+          </p:style>
+        </p:cxnSp>
+        <p:cxnSp>
+          <p:nvCxnSpPr>
+            <p:cNvPr id="46" name="Straight Arrow Connector 45"/>
+            <p:cNvCxnSpPr>
+              <a:stCxn id="13" idx="2"/>
+              <a:endCxn id="15" idx="0"/>
+            </p:cNvCxnSpPr>
+            <p:nvPr/>
+          </p:nvCxnSpPr>
+          <p:spPr>
+            <a:xfrm>
+              <a:off x="828210" y="4365104"/>
+              <a:ext cx="0" cy="166550"/>
+            </a:xfrm>
+            <a:prstGeom prst="straightConnector1">
+              <a:avLst/>
+            </a:prstGeom>
+            <a:ln w="28575">
+              <a:tailEnd type="arrow"/>
+            </a:ln>
+          </p:spPr>
+          <p:style>
+            <a:lnRef idx="1">
+              <a:schemeClr val="accent1"/>
+            </a:lnRef>
+            <a:fillRef idx="0">
+              <a:schemeClr val="accent1"/>
+            </a:fillRef>
+            <a:effectRef idx="0">
+              <a:schemeClr val="accent1"/>
+            </a:effectRef>
+            <a:fontRef idx="minor">
+              <a:schemeClr val="tx1"/>
+            </a:fontRef>
+          </p:style>
+        </p:cxnSp>
+        <p:cxnSp>
+          <p:nvCxnSpPr>
+            <p:cNvPr id="51" name="Straight Arrow Connector 50"/>
+            <p:cNvCxnSpPr>
+              <a:stCxn id="15" idx="4"/>
+              <a:endCxn id="14" idx="0"/>
+            </p:cNvCxnSpPr>
+            <p:nvPr/>
+          </p:nvCxnSpPr>
+          <p:spPr>
+            <a:xfrm>
+              <a:off x="828210" y="4846629"/>
+              <a:ext cx="0" cy="166549"/>
+            </a:xfrm>
+            <a:prstGeom prst="straightConnector1">
+              <a:avLst/>
+            </a:prstGeom>
+            <a:ln w="28575">
+              <a:tailEnd type="arrow"/>
+            </a:ln>
+          </p:spPr>
+          <p:style>
+            <a:lnRef idx="1">
+              <a:schemeClr val="accent1"/>
+            </a:lnRef>
+            <a:fillRef idx="0">
+              <a:schemeClr val="accent1"/>
+            </a:fillRef>
+            <a:effectRef idx="0">
+              <a:schemeClr val="accent1"/>
+            </a:effectRef>
+            <a:fontRef idx="minor">
+              <a:schemeClr val="tx1"/>
+            </a:fontRef>
+          </p:style>
+        </p:cxnSp>
+        <p:cxnSp>
+          <p:nvCxnSpPr>
+            <p:cNvPr id="56" name="Straight Arrow Connector 55"/>
+            <p:cNvCxnSpPr/>
+            <p:nvPr/>
+          </p:nvCxnSpPr>
+          <p:spPr>
+            <a:xfrm flipH="1">
+              <a:off x="828000" y="5373216"/>
+              <a:ext cx="110" cy="288032"/>
+            </a:xfrm>
+            <a:prstGeom prst="straightConnector1">
+              <a:avLst/>
+            </a:prstGeom>
+            <a:ln w="28575">
+              <a:tailEnd type="arrow"/>
+            </a:ln>
+          </p:spPr>
+          <p:style>
+            <a:lnRef idx="1">
+              <a:schemeClr val="accent1"/>
+            </a:lnRef>
+            <a:fillRef idx="0">
+              <a:schemeClr val="accent1"/>
+            </a:fillRef>
+            <a:effectRef idx="0">
+              <a:schemeClr val="accent1"/>
+            </a:effectRef>
+            <a:fontRef idx="minor">
+              <a:schemeClr val="tx1"/>
+            </a:fontRef>
+          </p:style>
+        </p:cxnSp>
         <p:sp>
           <p:nvSpPr>
-            <p:cNvPr id="81" name="TextBox 80"/>
+            <p:cNvPr id="58" name="TextBox 57"/>
             <p:cNvSpPr txBox="1"/>
             <p:nvPr/>
           </p:nvSpPr>
           <p:spPr>
             <a:xfrm>
-              <a:off x="1727894" y="3517558"/>
-              <a:ext cx="720080" cy="415498"/>
+              <a:off x="0" y="1700810"/>
+              <a:ext cx="720080" cy="276999"/>
             </a:xfrm>
             <a:prstGeom prst="rect">
               <a:avLst/>
@@ -5004,105 +4808,405 @@
             <a:lstStyle/>
             <a:p>
               <a:r>
-                <a:rPr lang="en-GB" sz="1050" b="1" dirty="0" smtClean="0">
+                <a:rPr lang="en-US" sz="1200" dirty="0" smtClean="0"/>
+                <a:t>&lt; 0.01</a:t>
+              </a:r>
+              <a:endParaRPr lang="en-GB" sz="1200" dirty="0"/>
+            </a:p>
+          </p:txBody>
+        </p:sp>
+        <p:sp>
+          <p:nvSpPr>
+            <p:cNvPr id="59" name="TextBox 58"/>
+            <p:cNvSpPr txBox="1"/>
+            <p:nvPr/>
+          </p:nvSpPr>
+          <p:spPr>
+            <a:xfrm>
+              <a:off x="2087934" y="1700810"/>
+              <a:ext cx="720080" cy="276999"/>
+            </a:xfrm>
+            <a:prstGeom prst="rect">
+              <a:avLst/>
+            </a:prstGeom>
+            <a:noFill/>
+          </p:spPr>
+          <p:txBody>
+            <a:bodyPr wrap="square" rtlCol="0">
+              <a:spAutoFit/>
+            </a:bodyPr>
+            <a:lstStyle/>
+            <a:p>
+              <a:r>
+                <a:rPr lang="en-GB" sz="1200" dirty="0" smtClean="0"/>
+                <a:t>≥ 0.01 </a:t>
+              </a:r>
+              <a:endParaRPr lang="en-GB" sz="1200" dirty="0"/>
+            </a:p>
+          </p:txBody>
+        </p:sp>
+        <p:sp>
+          <p:nvSpPr>
+            <p:cNvPr id="61" name="TextBox 60"/>
+            <p:cNvSpPr txBox="1"/>
+            <p:nvPr/>
+          </p:nvSpPr>
+          <p:spPr>
+            <a:xfrm>
+              <a:off x="2015926" y="4293098"/>
+              <a:ext cx="720080" cy="276999"/>
+            </a:xfrm>
+            <a:prstGeom prst="rect">
+              <a:avLst/>
+            </a:prstGeom>
+            <a:noFill/>
+          </p:spPr>
+          <p:txBody>
+            <a:bodyPr wrap="square" rtlCol="0">
+              <a:spAutoFit/>
+            </a:bodyPr>
+            <a:lstStyle/>
+            <a:p>
+              <a:r>
+                <a:rPr lang="en-GB" sz="1200" dirty="0" smtClean="0"/>
+                <a:t>no</a:t>
+              </a:r>
+              <a:endParaRPr lang="en-GB" sz="1200" dirty="0"/>
+            </a:p>
+          </p:txBody>
+        </p:sp>
+        <p:sp>
+          <p:nvSpPr>
+            <p:cNvPr id="62" name="TextBox 61"/>
+            <p:cNvSpPr txBox="1"/>
+            <p:nvPr/>
+          </p:nvSpPr>
+          <p:spPr>
+            <a:xfrm>
+              <a:off x="1007814" y="3728067"/>
+              <a:ext cx="720080" cy="276999"/>
+            </a:xfrm>
+            <a:prstGeom prst="rect">
+              <a:avLst/>
+            </a:prstGeom>
+            <a:noFill/>
+          </p:spPr>
+          <p:txBody>
+            <a:bodyPr wrap="square" rtlCol="0">
+              <a:spAutoFit/>
+            </a:bodyPr>
+            <a:lstStyle/>
+            <a:p>
+              <a:r>
+                <a:rPr lang="en-US" sz="1200" dirty="0" smtClean="0"/>
+                <a:t>yes</a:t>
+              </a:r>
+              <a:endParaRPr lang="en-GB" sz="1200" dirty="0"/>
+            </a:p>
+          </p:txBody>
+        </p:sp>
+        <p:grpSp>
+          <p:nvGrpSpPr>
+            <p:cNvPr id="48" name="Group 47"/>
+            <p:cNvGrpSpPr/>
+            <p:nvPr/>
+          </p:nvGrpSpPr>
+          <p:grpSpPr>
+            <a:xfrm>
+              <a:off x="1692000" y="3356992"/>
+              <a:ext cx="720080" cy="720080"/>
+              <a:chOff x="1655886" y="3356992"/>
+              <a:chExt cx="720080" cy="720080"/>
+            </a:xfrm>
+          </p:grpSpPr>
+          <p:sp>
+            <p:nvSpPr>
+              <p:cNvPr id="8" name="Diamond 7"/>
+              <p:cNvSpPr/>
+              <p:nvPr/>
+            </p:nvSpPr>
+            <p:spPr>
+              <a:xfrm>
+                <a:off x="1655886" y="3356992"/>
+                <a:ext cx="720080" cy="720080"/>
+              </a:xfrm>
+              <a:prstGeom prst="diamond">
+                <a:avLst/>
+              </a:prstGeom>
+              <a:solidFill>
+                <a:schemeClr val="tx1">
+                  <a:lumMod val="95000"/>
+                  <a:lumOff val="5000"/>
+                </a:schemeClr>
+              </a:solidFill>
+            </p:spPr>
+            <p:style>
+              <a:lnRef idx="2">
+                <a:schemeClr val="accent1">
+                  <a:shade val="50000"/>
+                </a:schemeClr>
+              </a:lnRef>
+              <a:fillRef idx="1">
+                <a:schemeClr val="accent1"/>
+              </a:fillRef>
+              <a:effectRef idx="0">
+                <a:schemeClr val="accent1"/>
+              </a:effectRef>
+              <a:fontRef idx="minor">
+                <a:schemeClr val="lt1"/>
+              </a:fontRef>
+            </p:style>
+            <p:txBody>
+              <a:bodyPr rtlCol="0" anchor="ctr"/>
+              <a:lstStyle/>
+              <a:p>
+                <a:pPr algn="ctr"/>
+                <a:endParaRPr lang="en-GB" sz="1050" b="1" dirty="0"/>
+              </a:p>
+            </p:txBody>
+          </p:sp>
+          <p:sp>
+            <p:nvSpPr>
+              <p:cNvPr id="81" name="TextBox 80"/>
+              <p:cNvSpPr txBox="1"/>
+              <p:nvPr/>
+            </p:nvSpPr>
+            <p:spPr>
+              <a:xfrm>
+                <a:off x="1655886" y="3517558"/>
+                <a:ext cx="720080" cy="415498"/>
+              </a:xfrm>
+              <a:prstGeom prst="rect">
+                <a:avLst/>
+              </a:prstGeom>
+              <a:noFill/>
+            </p:spPr>
+            <p:txBody>
+              <a:bodyPr wrap="square" rtlCol="0">
+                <a:spAutoFit/>
+              </a:bodyPr>
+              <a:lstStyle/>
+              <a:p>
+                <a:pPr algn="ctr"/>
+                <a:r>
+                  <a:rPr lang="en-GB" sz="1050" b="1" dirty="0" smtClean="0">
+                    <a:solidFill>
+                      <a:schemeClr val="bg1"/>
+                    </a:solidFill>
+                  </a:rPr>
+                  <a:t>Buffer        after?</a:t>
+                </a:r>
+                <a:endParaRPr lang="en-GB" sz="1050" b="1" dirty="0">
                   <a:solidFill>
                     <a:schemeClr val="bg1"/>
                   </a:solidFill>
-                </a:rPr>
-                <a:t>Second buffer?</a:t>
+                </a:endParaRPr>
+              </a:p>
+            </p:txBody>
+          </p:sp>
+        </p:grpSp>
+        <p:sp>
+          <p:nvSpPr>
+            <p:cNvPr id="33" name="Parallelogram 32"/>
+            <p:cNvSpPr/>
+            <p:nvPr/>
+          </p:nvSpPr>
+          <p:spPr>
+            <a:xfrm>
+              <a:off x="72275" y="3186037"/>
+              <a:ext cx="1511871" cy="314973"/>
+            </a:xfrm>
+            <a:prstGeom prst="parallelogram">
+              <a:avLst/>
+            </a:prstGeom>
+            <a:solidFill>
+              <a:schemeClr val="accent1">
+                <a:lumMod val="60000"/>
+                <a:lumOff val="40000"/>
+              </a:schemeClr>
+            </a:solidFill>
+          </p:spPr>
+          <p:style>
+            <a:lnRef idx="2">
+              <a:schemeClr val="accent1">
+                <a:shade val="50000"/>
+              </a:schemeClr>
+            </a:lnRef>
+            <a:fillRef idx="1">
+              <a:schemeClr val="accent1"/>
+            </a:fillRef>
+            <a:effectRef idx="0">
+              <a:schemeClr val="accent1"/>
+            </a:effectRef>
+            <a:fontRef idx="minor">
+              <a:schemeClr val="lt1"/>
+            </a:fontRef>
+          </p:style>
+          <p:txBody>
+            <a:bodyPr rtlCol="0" anchor="ctr"/>
+            <a:lstStyle/>
+            <a:p>
+              <a:pPr algn="ctr"/>
+              <a:r>
+                <a:rPr lang="en-US" sz="1050" b="1" dirty="0" smtClean="0"/>
+                <a:t>Buffer before &amp; </a:t>
               </a:r>
-              <a:endParaRPr lang="en-GB" sz="1050" b="1" dirty="0">
-                <a:solidFill>
-                  <a:schemeClr val="bg1"/>
-                </a:solidFill>
-              </a:endParaRPr>
+              <a:r>
+                <a:rPr lang="en-US" sz="1050" b="1" dirty="0" smtClean="0"/>
+                <a:t>sample</a:t>
+              </a:r>
+              <a:endParaRPr lang="en-GB" sz="1050" b="1" dirty="0"/>
             </a:p>
           </p:txBody>
         </p:sp>
+        <p:cxnSp>
+          <p:nvCxnSpPr>
+            <p:cNvPr id="39" name="Straight Arrow Connector 38"/>
+            <p:cNvCxnSpPr/>
+            <p:nvPr/>
+          </p:nvCxnSpPr>
+          <p:spPr>
+            <a:xfrm>
+              <a:off x="431750" y="3501008"/>
+              <a:ext cx="0" cy="504056"/>
+            </a:xfrm>
+            <a:prstGeom prst="straightConnector1">
+              <a:avLst/>
+            </a:prstGeom>
+            <a:ln w="28575">
+              <a:tailEnd type="arrow"/>
+            </a:ln>
+          </p:spPr>
+          <p:style>
+            <a:lnRef idx="1">
+              <a:schemeClr val="accent1"/>
+            </a:lnRef>
+            <a:fillRef idx="0">
+              <a:schemeClr val="accent1"/>
+            </a:fillRef>
+            <a:effectRef idx="0">
+              <a:schemeClr val="accent1"/>
+            </a:effectRef>
+            <a:fontRef idx="minor">
+              <a:schemeClr val="tx1"/>
+            </a:fontRef>
+          </p:style>
+        </p:cxnSp>
+        <p:cxnSp>
+          <p:nvCxnSpPr>
+            <p:cNvPr id="50" name="Elbow Connector 49"/>
+            <p:cNvCxnSpPr/>
+            <p:nvPr/>
+          </p:nvCxnSpPr>
+          <p:spPr>
+            <a:xfrm rot="5400000" flipH="1" flipV="1">
+              <a:off x="1475866" y="3681028"/>
+              <a:ext cx="1656184" cy="432048"/>
+            </a:xfrm>
+            <a:prstGeom prst="bentConnector3">
+              <a:avLst>
+                <a:gd name="adj1" fmla="val 310"/>
+              </a:avLst>
+            </a:prstGeom>
+            <a:ln w="19050">
+              <a:solidFill>
+                <a:schemeClr val="accent1">
+                  <a:lumMod val="75000"/>
+                </a:schemeClr>
+              </a:solidFill>
+              <a:prstDash val="sysDash"/>
+            </a:ln>
+          </p:spPr>
+          <p:style>
+            <a:lnRef idx="1">
+              <a:schemeClr val="accent1"/>
+            </a:lnRef>
+            <a:fillRef idx="0">
+              <a:schemeClr val="accent1"/>
+            </a:fillRef>
+            <a:effectRef idx="0">
+              <a:schemeClr val="accent1"/>
+            </a:effectRef>
+            <a:fontRef idx="minor">
+              <a:schemeClr val="tx1"/>
+            </a:fontRef>
+          </p:style>
+        </p:cxnSp>
+        <p:cxnSp>
+          <p:nvCxnSpPr>
+            <p:cNvPr id="57" name="Shape 56"/>
+            <p:cNvCxnSpPr>
+              <a:endCxn id="33" idx="1"/>
+            </p:cNvCxnSpPr>
+            <p:nvPr/>
+          </p:nvCxnSpPr>
+          <p:spPr>
+            <a:xfrm rot="10800000" flipV="1">
+              <a:off x="867582" y="3023889"/>
+              <a:ext cx="1652400" cy="162147"/>
+            </a:xfrm>
+            <a:prstGeom prst="bentConnector2">
+              <a:avLst/>
+            </a:prstGeom>
+            <a:ln w="19050">
+              <a:solidFill>
+                <a:schemeClr val="accent1">
+                  <a:lumMod val="75000"/>
+                </a:schemeClr>
+              </a:solidFill>
+              <a:prstDash val="sysDash"/>
+              <a:tailEnd type="arrow"/>
+            </a:ln>
+          </p:spPr>
+          <p:style>
+            <a:lnRef idx="1">
+              <a:schemeClr val="accent1"/>
+            </a:lnRef>
+            <a:fillRef idx="0">
+              <a:schemeClr val="accent1"/>
+            </a:fillRef>
+            <a:effectRef idx="0">
+              <a:schemeClr val="accent1"/>
+            </a:effectRef>
+            <a:fontRef idx="minor">
+              <a:schemeClr val="tx1"/>
+            </a:fontRef>
+          </p:style>
+        </p:cxnSp>
+        <p:cxnSp>
+          <p:nvCxnSpPr>
+            <p:cNvPr id="40" name="Straight Arrow Connector 39"/>
+            <p:cNvCxnSpPr/>
+            <p:nvPr/>
+          </p:nvCxnSpPr>
+          <p:spPr>
+            <a:xfrm>
+              <a:off x="2052000" y="2924944"/>
+              <a:ext cx="0" cy="429055"/>
+            </a:xfrm>
+            <a:prstGeom prst="straightConnector1">
+              <a:avLst/>
+            </a:prstGeom>
+            <a:ln w="28575">
+              <a:tailEnd type="arrow"/>
+            </a:ln>
+          </p:spPr>
+          <p:style>
+            <a:lnRef idx="1">
+              <a:schemeClr val="accent1"/>
+            </a:lnRef>
+            <a:fillRef idx="0">
+              <a:schemeClr val="accent1"/>
+            </a:fillRef>
+            <a:effectRef idx="0">
+              <a:schemeClr val="accent1"/>
+            </a:effectRef>
+            <a:fontRef idx="minor">
+              <a:schemeClr val="tx1"/>
+            </a:fontRef>
+          </p:style>
+        </p:cxnSp>
       </p:grpSp>
-      <p:sp>
-        <p:nvSpPr>
-          <p:cNvPr id="33" name="Parallelogram 32"/>
-          <p:cNvSpPr/>
-          <p:nvPr/>
-        </p:nvSpPr>
-        <p:spPr>
-          <a:xfrm>
-            <a:off x="72275" y="3186037"/>
-            <a:ext cx="1511871" cy="314973"/>
-          </a:xfrm>
-          <a:prstGeom prst="parallelogram">
-            <a:avLst/>
-          </a:prstGeom>
-          <a:solidFill>
-            <a:schemeClr val="accent1">
-              <a:lumMod val="60000"/>
-              <a:lumOff val="40000"/>
-            </a:schemeClr>
-          </a:solidFill>
-        </p:spPr>
-        <p:style>
-          <a:lnRef idx="2">
-            <a:schemeClr val="accent1">
-              <a:shade val="50000"/>
-            </a:schemeClr>
-          </a:lnRef>
-          <a:fillRef idx="1">
-            <a:schemeClr val="accent1"/>
-          </a:fillRef>
-          <a:effectRef idx="0">
-            <a:schemeClr val="accent1"/>
-          </a:effectRef>
-          <a:fontRef idx="minor">
-            <a:schemeClr val="lt1"/>
-          </a:fontRef>
-        </p:style>
-        <p:txBody>
-          <a:bodyPr rtlCol="0" anchor="ctr"/>
-          <a:lstStyle/>
-          <a:p>
-            <a:pPr algn="ctr"/>
-            <a:r>
-              <a:rPr lang="en-US" sz="1050" b="1" dirty="0" smtClean="0"/>
-              <a:t>First buffer &amp; sample</a:t>
-            </a:r>
-            <a:endParaRPr lang="en-GB" sz="1050" b="1" dirty="0"/>
-          </a:p>
-        </p:txBody>
-      </p:sp>
-      <p:cxnSp>
-        <p:nvCxnSpPr>
-          <p:cNvPr id="39" name="Straight Arrow Connector 38"/>
-          <p:cNvCxnSpPr/>
-          <p:nvPr/>
-        </p:nvCxnSpPr>
-        <p:spPr>
-          <a:xfrm>
-            <a:off x="431750" y="3501008"/>
-            <a:ext cx="0" cy="504056"/>
-          </a:xfrm>
-          <a:prstGeom prst="straightConnector1">
-            <a:avLst/>
-          </a:prstGeom>
-          <a:ln w="28575">
-            <a:tailEnd type="arrow"/>
-          </a:ln>
-        </p:spPr>
-        <p:style>
-          <a:lnRef idx="1">
-            <a:schemeClr val="accent1"/>
-          </a:lnRef>
-          <a:fillRef idx="0">
-            <a:schemeClr val="accent1"/>
-          </a:fillRef>
-          <a:effectRef idx="0">
-            <a:schemeClr val="accent1"/>
-          </a:effectRef>
-          <a:fontRef idx="minor">
-            <a:schemeClr val="tx1"/>
-          </a:fontRef>
-        </p:style>
-      </p:cxnSp>
     </p:spTree>
   </p:cSld>
   <p:clrMapOvr>
@@ -5223,11 +5327,7 @@
             <a:pPr algn="ctr"/>
             <a:r>
               <a:rPr lang="en-US" sz="1050" b="1" dirty="0" smtClean="0"/>
-              <a:t>Compare </a:t>
-            </a:r>
-            <a:r>
-              <a:rPr lang="en-US" sz="1050" b="1" dirty="0" smtClean="0"/>
-              <a:t>buffers using </a:t>
+              <a:t>Compare buffers using </a:t>
             </a:r>
             <a:r>
               <a:rPr lang="en-US" sz="1050" b="1" dirty="0" err="1" smtClean="0"/>
@@ -8152,11 +8252,7 @@
           <a:p>
             <a:r>
               <a:rPr lang="en-US" sz="1200" dirty="0" smtClean="0"/>
-              <a:t>a</a:t>
-            </a:r>
-            <a:r>
-              <a:rPr lang="en-US" sz="1200" dirty="0" smtClean="0"/>
-              <a:t>bove cutoff</a:t>
+              <a:t>above cutoff</a:t>
             </a:r>
             <a:endParaRPr lang="en-GB" sz="1200" dirty="0"/>
           </a:p>
@@ -8186,11 +8282,7 @@
           <a:p>
             <a:r>
               <a:rPr lang="en-US" sz="1200" dirty="0" smtClean="0"/>
-              <a:t>a</a:t>
-            </a:r>
-            <a:r>
-              <a:rPr lang="en-US" sz="1200" dirty="0" smtClean="0"/>
-              <a:t>bove cutoff</a:t>
+              <a:t>above cutoff</a:t>
             </a:r>
             <a:endParaRPr lang="en-GB" sz="1200" dirty="0"/>
           </a:p>
@@ -8220,11 +8312,7 @@
           <a:p>
             <a:r>
               <a:rPr lang="en-US" sz="1200" dirty="0" smtClean="0"/>
-              <a:t>below</a:t>
-            </a:r>
-            <a:r>
-              <a:rPr lang="en-US" sz="1200" dirty="0" smtClean="0"/>
-              <a:t> cutoff</a:t>
+              <a:t>below cutoff</a:t>
             </a:r>
             <a:endParaRPr lang="en-GB" sz="1200" dirty="0"/>
           </a:p>
@@ -8254,11 +8342,7 @@
           <a:p>
             <a:r>
               <a:rPr lang="en-US" sz="1200" dirty="0" smtClean="0"/>
-              <a:t>below</a:t>
-            </a:r>
-            <a:r>
-              <a:rPr lang="en-US" sz="1200" dirty="0" smtClean="0"/>
-              <a:t> cutoff</a:t>
+              <a:t>below cutoff</a:t>
             </a:r>
             <a:endParaRPr lang="en-GB" sz="1200" dirty="0"/>
           </a:p>

</xml_diff>

<commit_message>
Some changes as asked for by reviewers
</commit_message>
<xml_diff>
--- a/figures8cm.pptx
+++ b/figures8cm.pptx
@@ -198,7 +198,7 @@
             <a:fld id="{AC39F9EC-1C84-462C-976F-AFC0CE4CADE8}" type="datetimeFigureOut">
               <a:rPr lang="en-GB" smtClean="0"/>
               <a:pPr/>
-              <a:t>16/07/2015</a:t>
+              <a:t>15/09/13</a:t>
             </a:fld>
             <a:endParaRPr lang="en-GB"/>
           </a:p>
@@ -360,13 +360,18 @@
             <a:fld id="{3F84806E-C42F-45A9-B0A4-C38C49AF38A5}" type="slidenum">
               <a:rPr lang="en-GB" smtClean="0"/>
               <a:pPr/>
-              <a:t>‹#›</a:t>
+              <a:t>‹Nr.›</a:t>
             </a:fld>
             <a:endParaRPr lang="en-GB"/>
           </a:p>
         </p:txBody>
       </p:sp>
     </p:spTree>
+    <p:extLst>
+      <p:ext uri="{BB962C8B-B14F-4D97-AF65-F5344CB8AC3E}">
+        <p14:creationId xmlns:p14="http://schemas.microsoft.com/office/powerpoint/2010/main" val="1517964740"/>
+      </p:ext>
+    </p:extLst>
   </p:cSld>
   <p:clrMap bg1="lt1" tx1="dk1" bg2="lt2" tx2="dk2" accent1="accent1" accent2="accent2" accent3="accent3" accent4="accent4" accent5="accent5" accent6="accent6" hlink="hlink" folHlink="folHlink"/>
   <p:notesStyle>
@@ -1010,7 +1015,7 @@
             <a:fld id="{3260E9CB-E03B-4981-984A-9DFEF440CF5E}" type="datetimeFigureOut">
               <a:rPr lang="en-GB" smtClean="0"/>
               <a:pPr/>
-              <a:t>16/07/2015</a:t>
+              <a:t>15/09/13</a:t>
             </a:fld>
             <a:endParaRPr lang="en-GB"/>
           </a:p>
@@ -1053,7 +1058,7 @@
             <a:fld id="{C84B2222-3EB4-4002-9815-222CF4800AC1}" type="slidenum">
               <a:rPr lang="en-GB" smtClean="0"/>
               <a:pPr/>
-              <a:t>‹#›</a:t>
+              <a:t>‹Nr.›</a:t>
             </a:fld>
             <a:endParaRPr lang="en-GB"/>
           </a:p>
@@ -1177,7 +1182,7 @@
             <a:fld id="{3260E9CB-E03B-4981-984A-9DFEF440CF5E}" type="datetimeFigureOut">
               <a:rPr lang="en-GB" smtClean="0"/>
               <a:pPr/>
-              <a:t>16/07/2015</a:t>
+              <a:t>15/09/13</a:t>
             </a:fld>
             <a:endParaRPr lang="en-GB"/>
           </a:p>
@@ -1220,7 +1225,7 @@
             <a:fld id="{C84B2222-3EB4-4002-9815-222CF4800AC1}" type="slidenum">
               <a:rPr lang="en-GB" smtClean="0"/>
               <a:pPr/>
-              <a:t>‹#›</a:t>
+              <a:t>‹Nr.›</a:t>
             </a:fld>
             <a:endParaRPr lang="en-GB"/>
           </a:p>
@@ -1354,7 +1359,7 @@
             <a:fld id="{3260E9CB-E03B-4981-984A-9DFEF440CF5E}" type="datetimeFigureOut">
               <a:rPr lang="en-GB" smtClean="0"/>
               <a:pPr/>
-              <a:t>16/07/2015</a:t>
+              <a:t>15/09/13</a:t>
             </a:fld>
             <a:endParaRPr lang="en-GB"/>
           </a:p>
@@ -1397,7 +1402,7 @@
             <a:fld id="{C84B2222-3EB4-4002-9815-222CF4800AC1}" type="slidenum">
               <a:rPr lang="en-GB" smtClean="0"/>
               <a:pPr/>
-              <a:t>‹#›</a:t>
+              <a:t>‹Nr.›</a:t>
             </a:fld>
             <a:endParaRPr lang="en-GB"/>
           </a:p>
@@ -1521,7 +1526,7 @@
             <a:fld id="{3260E9CB-E03B-4981-984A-9DFEF440CF5E}" type="datetimeFigureOut">
               <a:rPr lang="en-GB" smtClean="0"/>
               <a:pPr/>
-              <a:t>16/07/2015</a:t>
+              <a:t>15/09/13</a:t>
             </a:fld>
             <a:endParaRPr lang="en-GB"/>
           </a:p>
@@ -1564,7 +1569,7 @@
             <a:fld id="{C84B2222-3EB4-4002-9815-222CF4800AC1}" type="slidenum">
               <a:rPr lang="en-GB" smtClean="0"/>
               <a:pPr/>
-              <a:t>‹#›</a:t>
+              <a:t>‹Nr.›</a:t>
             </a:fld>
             <a:endParaRPr lang="en-GB"/>
           </a:p>
@@ -1764,7 +1769,7 @@
             <a:fld id="{3260E9CB-E03B-4981-984A-9DFEF440CF5E}" type="datetimeFigureOut">
               <a:rPr lang="en-GB" smtClean="0"/>
               <a:pPr/>
-              <a:t>16/07/2015</a:t>
+              <a:t>15/09/13</a:t>
             </a:fld>
             <a:endParaRPr lang="en-GB"/>
           </a:p>
@@ -1807,7 +1812,7 @@
             <a:fld id="{C84B2222-3EB4-4002-9815-222CF4800AC1}" type="slidenum">
               <a:rPr lang="en-GB" smtClean="0"/>
               <a:pPr/>
-              <a:t>‹#›</a:t>
+              <a:t>‹Nr.›</a:t>
             </a:fld>
             <a:endParaRPr lang="en-GB"/>
           </a:p>
@@ -2049,7 +2054,7 @@
             <a:fld id="{3260E9CB-E03B-4981-984A-9DFEF440CF5E}" type="datetimeFigureOut">
               <a:rPr lang="en-GB" smtClean="0"/>
               <a:pPr/>
-              <a:t>16/07/2015</a:t>
+              <a:t>15/09/13</a:t>
             </a:fld>
             <a:endParaRPr lang="en-GB"/>
           </a:p>
@@ -2092,7 +2097,7 @@
             <a:fld id="{C84B2222-3EB4-4002-9815-222CF4800AC1}" type="slidenum">
               <a:rPr lang="en-GB" smtClean="0"/>
               <a:pPr/>
-              <a:t>‹#›</a:t>
+              <a:t>‹Nr.›</a:t>
             </a:fld>
             <a:endParaRPr lang="en-GB"/>
           </a:p>
@@ -2473,7 +2478,7 @@
             <a:fld id="{3260E9CB-E03B-4981-984A-9DFEF440CF5E}" type="datetimeFigureOut">
               <a:rPr lang="en-GB" smtClean="0"/>
               <a:pPr/>
-              <a:t>16/07/2015</a:t>
+              <a:t>15/09/13</a:t>
             </a:fld>
             <a:endParaRPr lang="en-GB"/>
           </a:p>
@@ -2516,7 +2521,7 @@
             <a:fld id="{C84B2222-3EB4-4002-9815-222CF4800AC1}" type="slidenum">
               <a:rPr lang="en-GB" smtClean="0"/>
               <a:pPr/>
-              <a:t>‹#›</a:t>
+              <a:t>‹Nr.›</a:t>
             </a:fld>
             <a:endParaRPr lang="en-GB"/>
           </a:p>
@@ -2588,7 +2593,7 @@
             <a:fld id="{3260E9CB-E03B-4981-984A-9DFEF440CF5E}" type="datetimeFigureOut">
               <a:rPr lang="en-GB" smtClean="0"/>
               <a:pPr/>
-              <a:t>16/07/2015</a:t>
+              <a:t>15/09/13</a:t>
             </a:fld>
             <a:endParaRPr lang="en-GB"/>
           </a:p>
@@ -2631,7 +2636,7 @@
             <a:fld id="{C84B2222-3EB4-4002-9815-222CF4800AC1}" type="slidenum">
               <a:rPr lang="en-GB" smtClean="0"/>
               <a:pPr/>
-              <a:t>‹#›</a:t>
+              <a:t>‹Nr.›</a:t>
             </a:fld>
             <a:endParaRPr lang="en-GB"/>
           </a:p>
@@ -2680,7 +2685,7 @@
             <a:fld id="{3260E9CB-E03B-4981-984A-9DFEF440CF5E}" type="datetimeFigureOut">
               <a:rPr lang="en-GB" smtClean="0"/>
               <a:pPr/>
-              <a:t>16/07/2015</a:t>
+              <a:t>15/09/13</a:t>
             </a:fld>
             <a:endParaRPr lang="en-GB"/>
           </a:p>
@@ -2723,7 +2728,7 @@
             <a:fld id="{C84B2222-3EB4-4002-9815-222CF4800AC1}" type="slidenum">
               <a:rPr lang="en-GB" smtClean="0"/>
               <a:pPr/>
-              <a:t>‹#›</a:t>
+              <a:t>‹Nr.›</a:t>
             </a:fld>
             <a:endParaRPr lang="en-GB"/>
           </a:p>
@@ -2954,7 +2959,7 @@
             <a:fld id="{3260E9CB-E03B-4981-984A-9DFEF440CF5E}" type="datetimeFigureOut">
               <a:rPr lang="en-GB" smtClean="0"/>
               <a:pPr/>
-              <a:t>16/07/2015</a:t>
+              <a:t>15/09/13</a:t>
             </a:fld>
             <a:endParaRPr lang="en-GB"/>
           </a:p>
@@ -2997,7 +3002,7 @@
             <a:fld id="{C84B2222-3EB4-4002-9815-222CF4800AC1}" type="slidenum">
               <a:rPr lang="en-GB" smtClean="0"/>
               <a:pPr/>
-              <a:t>‹#›</a:t>
+              <a:t>‹Nr.›</a:t>
             </a:fld>
             <a:endParaRPr lang="en-GB"/>
           </a:p>
@@ -3204,7 +3209,7 @@
             <a:fld id="{3260E9CB-E03B-4981-984A-9DFEF440CF5E}" type="datetimeFigureOut">
               <a:rPr lang="en-GB" smtClean="0"/>
               <a:pPr/>
-              <a:t>16/07/2015</a:t>
+              <a:t>15/09/13</a:t>
             </a:fld>
             <a:endParaRPr lang="en-GB"/>
           </a:p>
@@ -3247,7 +3252,7 @@
             <a:fld id="{C84B2222-3EB4-4002-9815-222CF4800AC1}" type="slidenum">
               <a:rPr lang="en-GB" smtClean="0"/>
               <a:pPr/>
-              <a:t>‹#›</a:t>
+              <a:t>‹Nr.›</a:t>
             </a:fld>
             <a:endParaRPr lang="en-GB"/>
           </a:p>
@@ -3414,7 +3419,7 @@
             <a:fld id="{3260E9CB-E03B-4981-984A-9DFEF440CF5E}" type="datetimeFigureOut">
               <a:rPr lang="en-GB" smtClean="0"/>
               <a:pPr/>
-              <a:t>16/07/2015</a:t>
+              <a:t>15/09/13</a:t>
             </a:fld>
             <a:endParaRPr lang="en-GB"/>
           </a:p>
@@ -3493,7 +3498,7 @@
             <a:fld id="{C84B2222-3EB4-4002-9815-222CF4800AC1}" type="slidenum">
               <a:rPr lang="en-GB" smtClean="0"/>
               <a:pPr/>
-              <a:t>‹#›</a:t>
+              <a:t>‹Nr.›</a:t>
             </a:fld>
             <a:endParaRPr lang="en-GB"/>
           </a:p>
@@ -5049,11 +5054,7 @@
               <a:pPr algn="ctr"/>
               <a:r>
                 <a:rPr lang="en-US" sz="1050" b="1" dirty="0" smtClean="0"/>
-                <a:t>Buffer before &amp; </a:t>
-              </a:r>
-              <a:r>
-                <a:rPr lang="en-US" sz="1050" b="1" dirty="0" smtClean="0"/>
-                <a:t>sample</a:t>
+                <a:t>Buffer before &amp; sample</a:t>
               </a:r>
               <a:endParaRPr lang="en-GB" sz="1050" b="1" dirty="0"/>
             </a:p>
@@ -5212,6 +5213,13 @@
   <p:clrMapOvr>
     <a:masterClrMapping/>
   </p:clrMapOvr>
+  <p:timing>
+    <p:tnLst>
+      <p:par>
+        <p:cTn xmlns:p14="http://schemas.microsoft.com/office/powerpoint/2010/main" id="1" dur="indefinite" restart="never" nodeType="tmRoot"/>
+      </p:par>
+    </p:tnLst>
+  </p:timing>
 </p:sld>
 </file>
 
@@ -5729,8 +5737,12 @@
               <a:p>
                 <a:pPr algn="ctr"/>
                 <a:r>
-                  <a:rPr lang="en-US" sz="1050" b="1" dirty="0" smtClean="0"/>
-                  <a:t>higher </a:t>
+                  <a:rPr lang="en-US" sz="1050" b="1" smtClean="0"/>
+                  <a:t>lower</a:t>
+                </a:r>
+                <a:r>
+                  <a:rPr lang="en-US" sz="1050" b="1" smtClean="0"/>
+                  <a:t> </a:t>
                 </a:r>
                 <a:r>
                   <a:rPr lang="en-US" sz="1050" b="1" dirty="0" err="1" smtClean="0"/>
@@ -6305,6 +6317,13 @@
   <p:clrMapOvr>
     <a:masterClrMapping/>
   </p:clrMapOvr>
+  <p:timing>
+    <p:tnLst>
+      <p:par>
+        <p:cTn xmlns:p14="http://schemas.microsoft.com/office/powerpoint/2010/main" id="1" dur="indefinite" restart="never" nodeType="tmRoot"/>
+      </p:par>
+    </p:tnLst>
+  </p:timing>
 </p:sld>
 </file>
 
@@ -8387,9 +8406,84 @@
         </p:xfrm>
         <a:graphic>
           <a:graphicData uri="http://schemas.openxmlformats.org/presentationml/2006/ole">
-            <p:oleObj spid="_x0000_s2050" name="Graph" r:id="rId3" imgW="1152000" imgH="719640" progId="Origin50.Graph">
-              <p:embed/>
-            </p:oleObj>
+            <mc:AlternateContent xmlns:mc="http://schemas.openxmlformats.org/markup-compatibility/2006">
+              <mc:Choice xmlns:v="urn:schemas-microsoft-com:vml" Requires="v">
+                <p:oleObj spid="_x0000_s2052" name="Graph" r:id="rId3" imgW="1152000" imgH="719640" progId="Origin50.Graph">
+                  <p:embed/>
+                </p:oleObj>
+              </mc:Choice>
+              <mc:Fallback>
+                <p:oleObj name="Graph" r:id="rId3" imgW="1152000" imgH="719640" progId="Origin50.Graph">
+                  <p:embed/>
+                  <p:pic>
+                    <p:nvPicPr>
+                      <p:cNvPr id="0" name="Picture 2"/>
+                      <p:cNvPicPr>
+                        <a:picLocks noChangeAspect="1" noChangeArrowheads="1"/>
+                      </p:cNvPicPr>
+                      <p:nvPr/>
+                    </p:nvPicPr>
+                    <p:blipFill>
+                      <a:blip r:embed="rId4">
+                        <a:extLst>
+                          <a:ext uri="{28A0092B-C50C-407E-A947-70E740481C1C}">
+                            <a14:useLocalDpi xmlns:a14="http://schemas.microsoft.com/office/drawing/2010/main" val="0"/>
+                          </a:ext>
+                        </a:extLst>
+                      </a:blip>
+                      <a:srcRect/>
+                      <a:stretch>
+                        <a:fillRect/>
+                      </a:stretch>
+                    </p:blipFill>
+                    <p:spPr bwMode="auto">
+                      <a:xfrm>
+                        <a:off x="0" y="548680"/>
+                        <a:ext cx="2885091" cy="1800200"/>
+                      </a:xfrm>
+                      <a:prstGeom prst="rect">
+                        <a:avLst/>
+                      </a:prstGeom>
+                      <a:noFill/>
+                      <a:ln>
+                        <a:noFill/>
+                      </a:ln>
+                      <a:effectLst/>
+                      <a:extLst>
+                        <a:ext uri="{909E8E84-426E-40dd-AFC4-6F175D3DCCD1}">
+                          <a14:hiddenFill xmlns:a14="http://schemas.microsoft.com/office/drawing/2010/main">
+                            <a:solidFill>
+                              <a:schemeClr val="accent1"/>
+                            </a:solidFill>
+                          </a14:hiddenFill>
+                        </a:ext>
+                        <a:ext uri="{91240B29-F687-4f45-9708-019B960494DF}">
+                          <a14:hiddenLine xmlns:a14="http://schemas.microsoft.com/office/drawing/2010/main" w="9525">
+                            <a:solidFill>
+                              <a:schemeClr val="tx1"/>
+                            </a:solidFill>
+                            <a:miter lim="800000"/>
+                            <a:headEnd/>
+                            <a:tailEnd/>
+                          </a14:hiddenLine>
+                        </a:ext>
+                        <a:ext uri="{AF507438-7753-43e0-B8FC-AC1667EBCBE1}">
+                          <a14:hiddenEffects xmlns:a14="http://schemas.microsoft.com/office/drawing/2010/main">
+                            <a:effectLst>
+                              <a:outerShdw blurRad="63500" dist="38099" dir="2700000" algn="ctr" rotWithShape="0">
+                                <a:schemeClr val="bg2">
+                                  <a:alpha val="74998"/>
+                                </a:schemeClr>
+                              </a:outerShdw>
+                            </a:effectLst>
+                          </a14:hiddenEffects>
+                        </a:ext>
+                      </a:extLst>
+                    </p:spPr>
+                  </p:pic>
+                </p:oleObj>
+              </mc:Fallback>
+            </mc:AlternateContent>
           </a:graphicData>
         </a:graphic>
       </p:graphicFrame>

</xml_diff>

<commit_message>
update figures under windows
</commit_message>
<xml_diff>
--- a/figures8cm.pptx
+++ b/figures8cm.pptx
@@ -112,6 +112,22 @@
       </a:defRPr>
     </a:lvl9pPr>
   </p:defaultTextStyle>
+  <p:extLst>
+    <p:ext uri="{EFAFB233-063F-42B5-8137-9DF3F51BA10A}">
+      <p15:sldGuideLst xmlns:p15="http://schemas.microsoft.com/office/powerpoint/2012/main">
+        <p15:guide id="1" orient="horz" pos="2160">
+          <p15:clr>
+            <a:srgbClr val="A4A3A4"/>
+          </p15:clr>
+        </p15:guide>
+        <p15:guide id="2" pos="907">
+          <p15:clr>
+            <a:srgbClr val="A4A3A4"/>
+          </p15:clr>
+        </p15:guide>
+      </p15:sldGuideLst>
+    </p:ext>
+  </p:extLst>
 </p:presentation>
 </file>
 
@@ -198,7 +214,7 @@
             <a:fld id="{AC39F9EC-1C84-462C-976F-AFC0CE4CADE8}" type="datetimeFigureOut">
               <a:rPr lang="en-GB" smtClean="0"/>
               <a:pPr/>
-              <a:t>15/09/13</a:t>
+              <a:t>04/11/2015</a:t>
             </a:fld>
             <a:endParaRPr lang="en-GB"/>
           </a:p>
@@ -360,7 +376,7 @@
             <a:fld id="{3F84806E-C42F-45A9-B0A4-C38C49AF38A5}" type="slidenum">
               <a:rPr lang="en-GB" smtClean="0"/>
               <a:pPr/>
-              <a:t>‹Nr.›</a:t>
+              <a:t>‹#›</a:t>
             </a:fld>
             <a:endParaRPr lang="en-GB"/>
           </a:p>
@@ -553,6 +569,11 @@
         </p:txBody>
       </p:sp>
     </p:spTree>
+    <p:extLst>
+      <p:ext uri="{BB962C8B-B14F-4D97-AF65-F5344CB8AC3E}">
+        <p14:creationId xmlns:p14="http://schemas.microsoft.com/office/powerpoint/2010/main" val="3475247628"/>
+      </p:ext>
+    </p:extLst>
   </p:cSld>
   <p:clrMapOvr>
     <a:masterClrMapping/>
@@ -644,6 +665,11 @@
         </p:txBody>
       </p:sp>
     </p:spTree>
+    <p:extLst>
+      <p:ext uri="{BB962C8B-B14F-4D97-AF65-F5344CB8AC3E}">
+        <p14:creationId xmlns:p14="http://schemas.microsoft.com/office/powerpoint/2010/main" val="1208200037"/>
+      </p:ext>
+    </p:extLst>
   </p:cSld>
   <p:clrMapOvr>
     <a:masterClrMapping/>
@@ -735,6 +761,11 @@
         </p:txBody>
       </p:sp>
     </p:spTree>
+    <p:extLst>
+      <p:ext uri="{BB962C8B-B14F-4D97-AF65-F5344CB8AC3E}">
+        <p14:creationId xmlns:p14="http://schemas.microsoft.com/office/powerpoint/2010/main" val="3779105345"/>
+      </p:ext>
+    </p:extLst>
   </p:cSld>
   <p:clrMapOvr>
     <a:masterClrMapping/>
@@ -826,6 +857,11 @@
         </p:txBody>
       </p:sp>
     </p:spTree>
+    <p:extLst>
+      <p:ext uri="{BB962C8B-B14F-4D97-AF65-F5344CB8AC3E}">
+        <p14:creationId xmlns:p14="http://schemas.microsoft.com/office/powerpoint/2010/main" val="3150120597"/>
+      </p:ext>
+    </p:extLst>
   </p:cSld>
   <p:clrMapOvr>
     <a:masterClrMapping/>
@@ -1015,7 +1051,7 @@
             <a:fld id="{3260E9CB-E03B-4981-984A-9DFEF440CF5E}" type="datetimeFigureOut">
               <a:rPr lang="en-GB" smtClean="0"/>
               <a:pPr/>
-              <a:t>15/09/13</a:t>
+              <a:t>04/11/2015</a:t>
             </a:fld>
             <a:endParaRPr lang="en-GB"/>
           </a:p>
@@ -1058,7 +1094,7 @@
             <a:fld id="{C84B2222-3EB4-4002-9815-222CF4800AC1}" type="slidenum">
               <a:rPr lang="en-GB" smtClean="0"/>
               <a:pPr/>
-              <a:t>‹Nr.›</a:t>
+              <a:t>‹#›</a:t>
             </a:fld>
             <a:endParaRPr lang="en-GB"/>
           </a:p>
@@ -1182,7 +1218,7 @@
             <a:fld id="{3260E9CB-E03B-4981-984A-9DFEF440CF5E}" type="datetimeFigureOut">
               <a:rPr lang="en-GB" smtClean="0"/>
               <a:pPr/>
-              <a:t>15/09/13</a:t>
+              <a:t>04/11/2015</a:t>
             </a:fld>
             <a:endParaRPr lang="en-GB"/>
           </a:p>
@@ -1225,7 +1261,7 @@
             <a:fld id="{C84B2222-3EB4-4002-9815-222CF4800AC1}" type="slidenum">
               <a:rPr lang="en-GB" smtClean="0"/>
               <a:pPr/>
-              <a:t>‹Nr.›</a:t>
+              <a:t>‹#›</a:t>
             </a:fld>
             <a:endParaRPr lang="en-GB"/>
           </a:p>
@@ -1359,7 +1395,7 @@
             <a:fld id="{3260E9CB-E03B-4981-984A-9DFEF440CF5E}" type="datetimeFigureOut">
               <a:rPr lang="en-GB" smtClean="0"/>
               <a:pPr/>
-              <a:t>15/09/13</a:t>
+              <a:t>04/11/2015</a:t>
             </a:fld>
             <a:endParaRPr lang="en-GB"/>
           </a:p>
@@ -1402,7 +1438,7 @@
             <a:fld id="{C84B2222-3EB4-4002-9815-222CF4800AC1}" type="slidenum">
               <a:rPr lang="en-GB" smtClean="0"/>
               <a:pPr/>
-              <a:t>‹Nr.›</a:t>
+              <a:t>‹#›</a:t>
             </a:fld>
             <a:endParaRPr lang="en-GB"/>
           </a:p>
@@ -1526,7 +1562,7 @@
             <a:fld id="{3260E9CB-E03B-4981-984A-9DFEF440CF5E}" type="datetimeFigureOut">
               <a:rPr lang="en-GB" smtClean="0"/>
               <a:pPr/>
-              <a:t>15/09/13</a:t>
+              <a:t>04/11/2015</a:t>
             </a:fld>
             <a:endParaRPr lang="en-GB"/>
           </a:p>
@@ -1569,7 +1605,7 @@
             <a:fld id="{C84B2222-3EB4-4002-9815-222CF4800AC1}" type="slidenum">
               <a:rPr lang="en-GB" smtClean="0"/>
               <a:pPr/>
-              <a:t>‹Nr.›</a:t>
+              <a:t>‹#›</a:t>
             </a:fld>
             <a:endParaRPr lang="en-GB"/>
           </a:p>
@@ -1769,7 +1805,7 @@
             <a:fld id="{3260E9CB-E03B-4981-984A-9DFEF440CF5E}" type="datetimeFigureOut">
               <a:rPr lang="en-GB" smtClean="0"/>
               <a:pPr/>
-              <a:t>15/09/13</a:t>
+              <a:t>04/11/2015</a:t>
             </a:fld>
             <a:endParaRPr lang="en-GB"/>
           </a:p>
@@ -1812,7 +1848,7 @@
             <a:fld id="{C84B2222-3EB4-4002-9815-222CF4800AC1}" type="slidenum">
               <a:rPr lang="en-GB" smtClean="0"/>
               <a:pPr/>
-              <a:t>‹Nr.›</a:t>
+              <a:t>‹#›</a:t>
             </a:fld>
             <a:endParaRPr lang="en-GB"/>
           </a:p>
@@ -2054,7 +2090,7 @@
             <a:fld id="{3260E9CB-E03B-4981-984A-9DFEF440CF5E}" type="datetimeFigureOut">
               <a:rPr lang="en-GB" smtClean="0"/>
               <a:pPr/>
-              <a:t>15/09/13</a:t>
+              <a:t>04/11/2015</a:t>
             </a:fld>
             <a:endParaRPr lang="en-GB"/>
           </a:p>
@@ -2097,7 +2133,7 @@
             <a:fld id="{C84B2222-3EB4-4002-9815-222CF4800AC1}" type="slidenum">
               <a:rPr lang="en-GB" smtClean="0"/>
               <a:pPr/>
-              <a:t>‹Nr.›</a:t>
+              <a:t>‹#›</a:t>
             </a:fld>
             <a:endParaRPr lang="en-GB"/>
           </a:p>
@@ -2478,7 +2514,7 @@
             <a:fld id="{3260E9CB-E03B-4981-984A-9DFEF440CF5E}" type="datetimeFigureOut">
               <a:rPr lang="en-GB" smtClean="0"/>
               <a:pPr/>
-              <a:t>15/09/13</a:t>
+              <a:t>04/11/2015</a:t>
             </a:fld>
             <a:endParaRPr lang="en-GB"/>
           </a:p>
@@ -2521,7 +2557,7 @@
             <a:fld id="{C84B2222-3EB4-4002-9815-222CF4800AC1}" type="slidenum">
               <a:rPr lang="en-GB" smtClean="0"/>
               <a:pPr/>
-              <a:t>‹Nr.›</a:t>
+              <a:t>‹#›</a:t>
             </a:fld>
             <a:endParaRPr lang="en-GB"/>
           </a:p>
@@ -2593,7 +2629,7 @@
             <a:fld id="{3260E9CB-E03B-4981-984A-9DFEF440CF5E}" type="datetimeFigureOut">
               <a:rPr lang="en-GB" smtClean="0"/>
               <a:pPr/>
-              <a:t>15/09/13</a:t>
+              <a:t>04/11/2015</a:t>
             </a:fld>
             <a:endParaRPr lang="en-GB"/>
           </a:p>
@@ -2636,7 +2672,7 @@
             <a:fld id="{C84B2222-3EB4-4002-9815-222CF4800AC1}" type="slidenum">
               <a:rPr lang="en-GB" smtClean="0"/>
               <a:pPr/>
-              <a:t>‹Nr.›</a:t>
+              <a:t>‹#›</a:t>
             </a:fld>
             <a:endParaRPr lang="en-GB"/>
           </a:p>
@@ -2685,7 +2721,7 @@
             <a:fld id="{3260E9CB-E03B-4981-984A-9DFEF440CF5E}" type="datetimeFigureOut">
               <a:rPr lang="en-GB" smtClean="0"/>
               <a:pPr/>
-              <a:t>15/09/13</a:t>
+              <a:t>04/11/2015</a:t>
             </a:fld>
             <a:endParaRPr lang="en-GB"/>
           </a:p>
@@ -2728,7 +2764,7 @@
             <a:fld id="{C84B2222-3EB4-4002-9815-222CF4800AC1}" type="slidenum">
               <a:rPr lang="en-GB" smtClean="0"/>
               <a:pPr/>
-              <a:t>‹Nr.›</a:t>
+              <a:t>‹#›</a:t>
             </a:fld>
             <a:endParaRPr lang="en-GB"/>
           </a:p>
@@ -2959,7 +2995,7 @@
             <a:fld id="{3260E9CB-E03B-4981-984A-9DFEF440CF5E}" type="datetimeFigureOut">
               <a:rPr lang="en-GB" smtClean="0"/>
               <a:pPr/>
-              <a:t>15/09/13</a:t>
+              <a:t>04/11/2015</a:t>
             </a:fld>
             <a:endParaRPr lang="en-GB"/>
           </a:p>
@@ -3002,7 +3038,7 @@
             <a:fld id="{C84B2222-3EB4-4002-9815-222CF4800AC1}" type="slidenum">
               <a:rPr lang="en-GB" smtClean="0"/>
               <a:pPr/>
-              <a:t>‹Nr.›</a:t>
+              <a:t>‹#›</a:t>
             </a:fld>
             <a:endParaRPr lang="en-GB"/>
           </a:p>
@@ -3209,7 +3245,7 @@
             <a:fld id="{3260E9CB-E03B-4981-984A-9DFEF440CF5E}" type="datetimeFigureOut">
               <a:rPr lang="en-GB" smtClean="0"/>
               <a:pPr/>
-              <a:t>15/09/13</a:t>
+              <a:t>04/11/2015</a:t>
             </a:fld>
             <a:endParaRPr lang="en-GB"/>
           </a:p>
@@ -3252,7 +3288,7 @@
             <a:fld id="{C84B2222-3EB4-4002-9815-222CF4800AC1}" type="slidenum">
               <a:rPr lang="en-GB" smtClean="0"/>
               <a:pPr/>
-              <a:t>‹Nr.›</a:t>
+              <a:t>‹#›</a:t>
             </a:fld>
             <a:endParaRPr lang="en-GB"/>
           </a:p>
@@ -3419,7 +3455,7 @@
             <a:fld id="{3260E9CB-E03B-4981-984A-9DFEF440CF5E}" type="datetimeFigureOut">
               <a:rPr lang="en-GB" smtClean="0"/>
               <a:pPr/>
-              <a:t>15/09/13</a:t>
+              <a:t>04/11/2015</a:t>
             </a:fld>
             <a:endParaRPr lang="en-GB"/>
           </a:p>
@@ -3498,7 +3534,7 @@
             <a:fld id="{C84B2222-3EB4-4002-9815-222CF4800AC1}" type="slidenum">
               <a:rPr lang="en-GB" smtClean="0"/>
               <a:pPr/>
-              <a:t>‹Nr.›</a:t>
+              <a:t>‹#›</a:t>
             </a:fld>
             <a:endParaRPr lang="en-GB"/>
           </a:p>
@@ -5216,7 +5252,7 @@
   <p:timing>
     <p:tnLst>
       <p:par>
-        <p:cTn xmlns:p14="http://schemas.microsoft.com/office/powerpoint/2010/main" id="1" dur="indefinite" restart="never" nodeType="tmRoot"/>
+        <p:cTn id="1" dur="indefinite" restart="never" nodeType="tmRoot"/>
       </p:par>
     </p:tnLst>
   </p:timing>
@@ -5403,8 +5439,8 @@
         </p:nvSpPr>
         <p:spPr>
           <a:xfrm>
-            <a:off x="503759" y="4437114"/>
-            <a:ext cx="1511871" cy="314973"/>
+            <a:off x="647774" y="5032495"/>
+            <a:ext cx="1440160" cy="314973"/>
           </a:xfrm>
           <a:prstGeom prst="parallelogram">
             <a:avLst/>
@@ -5454,9 +5490,9 @@
         <p:grpSpPr>
           <a:xfrm>
             <a:off x="108000" y="3820639"/>
-            <a:ext cx="2556128" cy="314973"/>
+            <a:ext cx="2628006" cy="314973"/>
             <a:chOff x="143718" y="3703562"/>
-            <a:chExt cx="2556128" cy="314973"/>
+            <a:chExt cx="2628006" cy="314973"/>
           </a:xfrm>
         </p:grpSpPr>
         <p:sp>
@@ -5517,8 +5553,8 @@
           </p:nvSpPr>
           <p:spPr>
             <a:xfrm>
-              <a:off x="1547718" y="3703562"/>
-              <a:ext cx="1152128" cy="314973"/>
+              <a:off x="1442944" y="3703562"/>
+              <a:ext cx="1328780" cy="314973"/>
             </a:xfrm>
             <a:prstGeom prst="parallelogram">
               <a:avLst/>
@@ -5569,9 +5605,9 @@
         <p:grpSpPr>
           <a:xfrm>
             <a:off x="215726" y="2060850"/>
-            <a:ext cx="2376264" cy="1488855"/>
+            <a:ext cx="2376263" cy="2736302"/>
             <a:chOff x="215726" y="2060848"/>
-            <a:chExt cx="2376264" cy="1488855"/>
+            <a:chExt cx="2376263" cy="2736302"/>
           </a:xfrm>
         </p:grpSpPr>
         <p:grpSp>
@@ -5583,9 +5619,9 @@
           <p:grpSpPr>
             <a:xfrm>
               <a:off x="215726" y="2060848"/>
-              <a:ext cx="2376264" cy="1488855"/>
+              <a:ext cx="1788042" cy="2736302"/>
               <a:chOff x="215726" y="2060848"/>
-              <a:chExt cx="2376264" cy="1488855"/>
+              <a:chExt cx="1788042" cy="2736302"/>
             </a:xfrm>
           </p:grpSpPr>
           <p:sp>
@@ -5738,11 +5774,7 @@
                 <a:pPr algn="ctr"/>
                 <a:r>
                   <a:rPr lang="en-US" sz="1050" b="1" smtClean="0"/>
-                  <a:t>lower</a:t>
-                </a:r>
-                <a:r>
-                  <a:rPr lang="en-US" sz="1050" b="1" smtClean="0"/>
-                  <a:t> </a:t>
+                  <a:t>lower </a:t>
                 </a:r>
                 <a:r>
                   <a:rPr lang="en-US" sz="1050" b="1" dirty="0" err="1" smtClean="0"/>
@@ -5772,8 +5804,8 @@
             </p:nvSpPr>
             <p:spPr>
               <a:xfrm>
-                <a:off x="1583878" y="2907460"/>
-                <a:ext cx="1008112" cy="360040"/>
+                <a:off x="791789" y="4437110"/>
+                <a:ext cx="1211979" cy="360040"/>
               </a:xfrm>
               <a:prstGeom prst="rect">
                 <a:avLst/>
@@ -5821,7 +5853,7 @@
           </p:nvSpPr>
           <p:spPr>
             <a:xfrm>
-              <a:off x="1583878" y="2343052"/>
+              <a:off x="1583878" y="2708918"/>
               <a:ext cx="1008111" cy="360040"/>
             </a:xfrm>
             <a:prstGeom prst="rect">
@@ -5910,7 +5942,7 @@
         <p:spPr>
           <a:xfrm>
             <a:off x="1691890" y="1520788"/>
-            <a:ext cx="396044" cy="822264"/>
+            <a:ext cx="396044" cy="1188132"/>
           </a:xfrm>
           <a:prstGeom prst="bentConnector2">
             <a:avLst/>
@@ -6083,14 +6115,14 @@
           <p:cNvPr id="48" name="Straight Arrow Connector 47"/>
           <p:cNvCxnSpPr>
             <a:stCxn id="28" idx="2"/>
-            <a:endCxn id="27" idx="0"/>
+            <a:endCxn id="24" idx="0"/>
           </p:cNvCxnSpPr>
           <p:nvPr/>
         </p:nvCxnSpPr>
         <p:spPr>
-          <a:xfrm>
-            <a:off x="2087934" y="2703092"/>
-            <a:ext cx="0" cy="204368"/>
+          <a:xfrm flipH="1">
+            <a:off x="2071616" y="3068960"/>
+            <a:ext cx="16318" cy="751679"/>
           </a:xfrm>
           <a:prstGeom prst="straightConnector1">
             <a:avLst/>
@@ -6119,14 +6151,14 @@
           <p:cNvPr id="49" name="Straight Arrow Connector 48"/>
           <p:cNvCxnSpPr>
             <a:stCxn id="27" idx="2"/>
-            <a:endCxn id="24" idx="0"/>
+            <a:endCxn id="18" idx="1"/>
           </p:cNvCxnSpPr>
           <p:nvPr/>
         </p:nvCxnSpPr>
         <p:spPr>
           <a:xfrm>
-            <a:off x="2087934" y="3267502"/>
-            <a:ext cx="130" cy="553137"/>
+            <a:off x="1397779" y="4797152"/>
+            <a:ext cx="9447" cy="235343"/>
           </a:xfrm>
           <a:prstGeom prst="straightConnector1">
             <a:avLst/>
@@ -6320,7 +6352,7 @@
   <p:timing>
     <p:tnLst>
       <p:par>
-        <p:cTn xmlns:p14="http://schemas.microsoft.com/office/powerpoint/2010/main" id="1" dur="indefinite" restart="never" nodeType="tmRoot"/>
+        <p:cTn id="1" dur="indefinite" restart="never" nodeType="tmRoot"/>
       </p:par>
     </p:tnLst>
   </p:timing>
@@ -8408,7 +8440,7 @@
           <a:graphicData uri="http://schemas.openxmlformats.org/presentationml/2006/ole">
             <mc:AlternateContent xmlns:mc="http://schemas.openxmlformats.org/markup-compatibility/2006">
               <mc:Choice xmlns:v="urn:schemas-microsoft-com:vml" Requires="v">
-                <p:oleObj spid="_x0000_s2052" name="Graph" r:id="rId3" imgW="1152000" imgH="719640" progId="Origin50.Graph">
+                <p:oleObj spid="_x0000_s2054" name="Graph" r:id="rId3" imgW="1152000" imgH="719640" progId="Origin50.Graph">
                   <p:embed/>
                 </p:oleObj>
               </mc:Choice>
@@ -8451,14 +8483,14 @@
                       <a:effectLst/>
                       <a:extLst>
                         <a:ext uri="{909E8E84-426E-40dd-AFC4-6F175D3DCCD1}">
-                          <a14:hiddenFill xmlns:a14="http://schemas.microsoft.com/office/drawing/2010/main">
+                          <a14:hiddenFill xmlns:a14="http://schemas.microsoft.com/office/drawing/2010/main" xmlns="">
                             <a:solidFill>
                               <a:schemeClr val="accent1"/>
                             </a:solidFill>
                           </a14:hiddenFill>
                         </a:ext>
                         <a:ext uri="{91240B29-F687-4f45-9708-019B960494DF}">
-                          <a14:hiddenLine xmlns:a14="http://schemas.microsoft.com/office/drawing/2010/main" w="9525">
+                          <a14:hiddenLine xmlns:a14="http://schemas.microsoft.com/office/drawing/2010/main" xmlns="" w="9525">
                             <a:solidFill>
                               <a:schemeClr val="tx1"/>
                             </a:solidFill>
@@ -8468,7 +8500,7 @@
                           </a14:hiddenLine>
                         </a:ext>
                         <a:ext uri="{AF507438-7753-43e0-B8FC-AC1667EBCBE1}">
-                          <a14:hiddenEffects xmlns:a14="http://schemas.microsoft.com/office/drawing/2010/main">
+                          <a14:hiddenEffects xmlns:a14="http://schemas.microsoft.com/office/drawing/2010/main" xmlns="">
                             <a:effectLst>
                               <a:outerShdw blurRad="63500" dist="38099" dir="2700000" algn="ctr" rotWithShape="0">
                                 <a:schemeClr val="bg2">

</xml_diff>